<commit_message>
Small changes to future work
</commit_message>
<xml_diff>
--- a/Intermediate Presentation.pptx
+++ b/Intermediate Presentation.pptx
@@ -5007,6 +5007,19 @@
             </a:r>
           </a:p>
           <a:p>
+            <a:r>
+              <a:rPr lang="nl-NL" dirty="0" smtClean="0"/>
+              <a:t>Slideshows</a:t>
+            </a:r>
+          </a:p>
+          <a:p>
+            <a:r>
+              <a:rPr lang="nl-NL" dirty="0" err="1" smtClean="0"/>
+              <a:t>Inclusions</a:t>
+            </a:r>
+            <a:endParaRPr lang="nl-NL" dirty="0" smtClean="0"/>
+          </a:p>
+          <a:p>
             <a:endParaRPr lang="nl-NL" dirty="0" smtClean="0"/>
           </a:p>
         </p:txBody>
@@ -5152,7 +5165,19 @@
           <a:p>
             <a:r>
               <a:rPr lang="nl-NL" dirty="0" smtClean="0"/>
-              <a:t>Native output naar talen anders dan latex</a:t>
+              <a:t>Native output naar </a:t>
+            </a:r>
+            <a:r>
+              <a:rPr lang="nl-NL" smtClean="0"/>
+              <a:t>talen </a:t>
+            </a:r>
+            <a:r>
+              <a:rPr lang="nl-NL" smtClean="0"/>
+              <a:t>ander </a:t>
+            </a:r>
+            <a:r>
+              <a:rPr lang="nl-NL" dirty="0" smtClean="0"/>
+              <a:t>dan latex</a:t>
             </a:r>
           </a:p>
           <a:p>
@@ -5338,11 +5363,7 @@
             </a:r>
             <a:r>
               <a:rPr lang="nl-NL" dirty="0" smtClean="0"/>
-              <a:t> </a:t>
-            </a:r>
-            <a:r>
-              <a:rPr lang="nl-NL" dirty="0" smtClean="0"/>
-              <a:t>program e.g. word</a:t>
+              <a:t> program e.g. word</a:t>
             </a:r>
             <a:endParaRPr lang="nl-BE" dirty="0"/>
           </a:p>

</xml_diff>

<commit_message>
Added most slides for the presentation
</commit_message>
<xml_diff>
--- a/Intermediate Presentation.pptx
+++ b/Intermediate Presentation.pptx
@@ -5,7 +5,7 @@
     <p:sldMasterId id="2147483648" r:id="rId1"/>
   </p:sldMasterIdLst>
   <p:notesMasterIdLst>
-    <p:notesMasterId r:id="rId21"/>
+    <p:notesMasterId r:id="rId22"/>
   </p:notesMasterIdLst>
   <p:sldIdLst>
     <p:sldId id="256" r:id="rId2"/>
@@ -19,14 +19,15 @@
     <p:sldId id="264" r:id="rId10"/>
     <p:sldId id="270" r:id="rId11"/>
     <p:sldId id="265" r:id="rId12"/>
-    <p:sldId id="273" r:id="rId13"/>
-    <p:sldId id="266" r:id="rId14"/>
-    <p:sldId id="267" r:id="rId15"/>
+    <p:sldId id="275" r:id="rId13"/>
+    <p:sldId id="273" r:id="rId14"/>
+    <p:sldId id="266" r:id="rId15"/>
     <p:sldId id="268" r:id="rId16"/>
     <p:sldId id="269" r:id="rId17"/>
     <p:sldId id="271" r:id="rId18"/>
-    <p:sldId id="272" r:id="rId19"/>
-    <p:sldId id="274" r:id="rId20"/>
+    <p:sldId id="267" r:id="rId19"/>
+    <p:sldId id="272" r:id="rId20"/>
+    <p:sldId id="274" r:id="rId21"/>
   </p:sldIdLst>
   <p:sldSz cx="12192000" cy="6858000"/>
   <p:notesSz cx="6858000" cy="9144000"/>
@@ -215,7 +216,7 @@
           <a:p>
             <a:fld id="{01963D08-B959-4AB6-95BF-A28840883159}" type="datetimeFigureOut">
               <a:rPr lang="nl-BE" smtClean="0"/>
-              <a:t>13/03/2016</a:t>
+              <a:t>14/03/2016</a:t>
             </a:fld>
             <a:endParaRPr lang="nl-BE"/>
           </a:p>
@@ -632,7 +633,7 @@
           <a:p>
             <a:fld id="{3393AA9F-D72C-463D-9782-972043CF7B88}" type="slidenum">
               <a:rPr lang="nl-BE" smtClean="0"/>
-              <a:t>18</a:t>
+              <a:t>19</a:t>
             </a:fld>
             <a:endParaRPr lang="nl-BE"/>
           </a:p>
@@ -716,7 +717,7 @@
           <a:p>
             <a:fld id="{3393AA9F-D72C-463D-9782-972043CF7B88}" type="slidenum">
               <a:rPr lang="nl-BE" smtClean="0"/>
-              <a:t>19</a:t>
+              <a:t>20</a:t>
             </a:fld>
             <a:endParaRPr lang="nl-BE"/>
           </a:p>
@@ -866,7 +867,7 @@
           <a:p>
             <a:fld id="{9E72DAE6-35CB-4F75-B445-E63BA6E6BE9D}" type="datetime1">
               <a:rPr lang="nl-BE" smtClean="0"/>
-              <a:t>13/03/2016</a:t>
+              <a:t>14/03/2016</a:t>
             </a:fld>
             <a:endParaRPr lang="nl-BE"/>
           </a:p>
@@ -1040,7 +1041,7 @@
           <a:p>
             <a:fld id="{AB3B8E0A-2F7D-4C42-A4F7-EA05A5027511}" type="datetime1">
               <a:rPr lang="nl-BE" smtClean="0"/>
-              <a:t>13/03/2016</a:t>
+              <a:t>14/03/2016</a:t>
             </a:fld>
             <a:endParaRPr lang="nl-BE"/>
           </a:p>
@@ -1224,7 +1225,7 @@
           <a:p>
             <a:fld id="{2931C40C-86C9-4653-BEC0-4FB034E8A536}" type="datetime1">
               <a:rPr lang="nl-BE" smtClean="0"/>
-              <a:t>13/03/2016</a:t>
+              <a:t>14/03/2016</a:t>
             </a:fld>
             <a:endParaRPr lang="nl-BE"/>
           </a:p>
@@ -1398,7 +1399,7 @@
           <a:p>
             <a:fld id="{1928B6EA-3481-40C9-8B91-73902F4E22C5}" type="datetime1">
               <a:rPr lang="nl-BE" smtClean="0"/>
-              <a:t>13/03/2016</a:t>
+              <a:t>14/03/2016</a:t>
             </a:fld>
             <a:endParaRPr lang="nl-BE"/>
           </a:p>
@@ -1648,7 +1649,7 @@
           <a:p>
             <a:fld id="{A76593C9-74D7-46BC-9A16-90B18C8AEAE6}" type="datetime1">
               <a:rPr lang="nl-BE" smtClean="0"/>
-              <a:t>13/03/2016</a:t>
+              <a:t>14/03/2016</a:t>
             </a:fld>
             <a:endParaRPr lang="nl-BE"/>
           </a:p>
@@ -1884,7 +1885,7 @@
           <a:p>
             <a:fld id="{AF988A33-DBC2-4F3C-8E3E-C5BCA46411FA}" type="datetime1">
               <a:rPr lang="nl-BE" smtClean="0"/>
-              <a:t>13/03/2016</a:t>
+              <a:t>14/03/2016</a:t>
             </a:fld>
             <a:endParaRPr lang="nl-BE"/>
           </a:p>
@@ -2255,7 +2256,7 @@
           <a:p>
             <a:fld id="{101A8F35-61A6-4FCE-98C1-BD56B64042FD}" type="datetime1">
               <a:rPr lang="nl-BE" smtClean="0"/>
-              <a:t>13/03/2016</a:t>
+              <a:t>14/03/2016</a:t>
             </a:fld>
             <a:endParaRPr lang="nl-BE"/>
           </a:p>
@@ -2377,7 +2378,7 @@
           <a:p>
             <a:fld id="{A3AB6747-8571-485F-8138-80A60DD0F67C}" type="datetime1">
               <a:rPr lang="nl-BE" smtClean="0"/>
-              <a:t>13/03/2016</a:t>
+              <a:t>14/03/2016</a:t>
             </a:fld>
             <a:endParaRPr lang="nl-BE"/>
           </a:p>
@@ -2476,7 +2477,7 @@
           <a:p>
             <a:fld id="{9A50E496-7786-4BD6-9882-6AE5A6512998}" type="datetime1">
               <a:rPr lang="nl-BE" smtClean="0"/>
-              <a:t>13/03/2016</a:t>
+              <a:t>14/03/2016</a:t>
             </a:fld>
             <a:endParaRPr lang="nl-BE"/>
           </a:p>
@@ -2757,7 +2758,7 @@
           <a:p>
             <a:fld id="{80C7D598-A32E-4E16-9D25-37512F304E09}" type="datetime1">
               <a:rPr lang="nl-BE" smtClean="0"/>
-              <a:t>13/03/2016</a:t>
+              <a:t>14/03/2016</a:t>
             </a:fld>
             <a:endParaRPr lang="nl-BE"/>
           </a:p>
@@ -3014,7 +3015,7 @@
           <a:p>
             <a:fld id="{F5909C26-1E95-4033-8084-732BC7DA3826}" type="datetime1">
               <a:rPr lang="nl-BE" smtClean="0"/>
-              <a:t>13/03/2016</a:t>
+              <a:t>14/03/2016</a:t>
             </a:fld>
             <a:endParaRPr lang="nl-BE"/>
           </a:p>
@@ -3231,7 +3232,7 @@
           <a:p>
             <a:fld id="{ADED6692-0A52-436D-84AE-22609B4C7703}" type="datetime1">
               <a:rPr lang="nl-BE" smtClean="0"/>
-              <a:t>13/03/2016</a:t>
+              <a:t>14/03/2016</a:t>
             </a:fld>
             <a:endParaRPr lang="nl-BE"/>
           </a:p>
@@ -3727,7 +3728,7 @@
           <a:p>
             <a:r>
               <a:rPr lang="nl-NL" dirty="0" smtClean="0"/>
-              <a:t>Promotor: Prof. Marko van Dooren</a:t>
+              <a:t>Promotor: Professor Marko van Dooren</a:t>
             </a:r>
             <a:endParaRPr lang="nl-BE" dirty="0"/>
           </a:p>
@@ -3786,13 +3787,29 @@
           <a:lstStyle/>
           <a:p>
             <a:r>
-              <a:rPr lang="nl-NL" dirty="0" smtClean="0"/>
-              <a:t>Output in </a:t>
+              <a:rPr lang="nl-NL" dirty="0" err="1" smtClean="0"/>
+              <a:t>Why</a:t>
+            </a:r>
+            <a:r>
+              <a:rPr lang="nl-NL" dirty="0" smtClean="0"/>
+              <a:t> o</a:t>
+            </a:r>
+            <a:r>
+              <a:rPr lang="nl-NL" dirty="0" smtClean="0"/>
+              <a:t>utput </a:t>
+            </a:r>
+            <a:r>
+              <a:rPr lang="nl-NL" dirty="0" smtClean="0"/>
+              <a:t>in </a:t>
             </a:r>
             <a:r>
               <a:rPr lang="nl-NL" dirty="0" err="1" smtClean="0"/>
               <a:t>java</a:t>
             </a:r>
+            <a:r>
+              <a:rPr lang="nl-NL" dirty="0" smtClean="0"/>
+              <a:t>?</a:t>
+            </a:r>
             <a:endParaRPr lang="nl-BE" dirty="0"/>
           </a:p>
         </p:txBody>
@@ -3818,15 +3835,78 @@
             </a:r>
             <a:r>
               <a:rPr lang="nl-NL" dirty="0" smtClean="0"/>
-              <a:t> kan </a:t>
-            </a:r>
-            <a:r>
-              <a:rPr lang="nl-NL" dirty="0" err="1" smtClean="0"/>
-              <a:t>java</a:t>
-            </a:r>
-            <a:r>
-              <a:rPr lang="nl-NL" dirty="0" smtClean="0"/>
-              <a:t> uitschrijven, statisch, platform onafhankelijk</a:t>
+              <a:t> </a:t>
+            </a:r>
+            <a:r>
+              <a:rPr lang="nl-NL" dirty="0" err="1" smtClean="0"/>
+              <a:t>can</a:t>
+            </a:r>
+            <a:r>
+              <a:rPr lang="nl-NL" dirty="0" smtClean="0"/>
+              <a:t> output Java</a:t>
+            </a:r>
+          </a:p>
+          <a:p>
+            <a:endParaRPr lang="nl-NL" dirty="0" smtClean="0"/>
+          </a:p>
+          <a:p>
+            <a:r>
+              <a:rPr lang="nl-NL" dirty="0" smtClean="0"/>
+              <a:t>Java is </a:t>
+            </a:r>
+            <a:r>
+              <a:rPr lang="nl-NL" dirty="0" err="1" smtClean="0"/>
+              <a:t>statically</a:t>
+            </a:r>
+            <a:r>
+              <a:rPr lang="nl-NL" dirty="0" smtClean="0"/>
+              <a:t> </a:t>
+            </a:r>
+            <a:r>
+              <a:rPr lang="nl-NL" dirty="0" err="1" smtClean="0"/>
+              <a:t>typed</a:t>
+            </a:r>
+            <a:endParaRPr lang="nl-NL" dirty="0" smtClean="0"/>
+          </a:p>
+          <a:p>
+            <a:pPr marL="0" indent="0">
+              <a:buNone/>
+            </a:pPr>
+            <a:endParaRPr lang="nl-NL" dirty="0"/>
+          </a:p>
+          <a:p>
+            <a:r>
+              <a:rPr lang="nl-NL" dirty="0" smtClean="0"/>
+              <a:t>Java is platform independent</a:t>
+            </a:r>
+          </a:p>
+          <a:p>
+            <a:endParaRPr lang="nl-NL" dirty="0"/>
+          </a:p>
+          <a:p>
+            <a:r>
+              <a:rPr lang="nl-NL" dirty="0" smtClean="0"/>
+              <a:t>Java </a:t>
+            </a:r>
+            <a:r>
+              <a:rPr lang="nl-NL" dirty="0" err="1" smtClean="0"/>
+              <a:t>semantic</a:t>
+            </a:r>
+            <a:r>
+              <a:rPr lang="nl-NL" dirty="0" smtClean="0"/>
+              <a:t> ≈ </a:t>
+            </a:r>
+            <a:r>
+              <a:rPr lang="nl-NL" dirty="0" err="1" smtClean="0"/>
+              <a:t>Neio</a:t>
+            </a:r>
+            <a:r>
+              <a:rPr lang="nl-NL" dirty="0" smtClean="0"/>
+              <a:t> </a:t>
+            </a:r>
+            <a:r>
+              <a:rPr lang="nl-NL" dirty="0" err="1" smtClean="0"/>
+              <a:t>semantic</a:t>
             </a:r>
             <a:endParaRPr lang="nl-BE" dirty="0"/>
           </a:p>
@@ -3938,7 +4018,7 @@
           <a:p>
             <a:r>
               <a:rPr lang="nl-NL" dirty="0" smtClean="0"/>
-              <a:t>Opbouw van een document</a:t>
+              <a:t>Building a document</a:t>
             </a:r>
             <a:endParaRPr lang="nl-BE" dirty="0"/>
           </a:p>
@@ -3961,20 +4041,39 @@
           <a:p>
             <a:r>
               <a:rPr lang="nl-NL" dirty="0" smtClean="0"/>
-              <a:t>Documentclass</a:t>
-            </a:r>
-          </a:p>
-          <a:p>
-            <a:r>
-              <a:rPr lang="nl-NL" dirty="0" smtClean="0"/>
-              <a:t>Alles is een methode oproep</a:t>
-            </a:r>
-          </a:p>
-          <a:p>
-            <a:r>
-              <a:rPr lang="nl-NL" dirty="0" smtClean="0"/>
-              <a:t>Toon opbouw van eenvoudig document</a:t>
-            </a:r>
+              <a:t>Start out </a:t>
+            </a:r>
+            <a:r>
+              <a:rPr lang="nl-NL" dirty="0" err="1" smtClean="0"/>
+              <a:t>with</a:t>
+            </a:r>
+            <a:r>
+              <a:rPr lang="nl-NL" dirty="0" smtClean="0"/>
+              <a:t> documentclass</a:t>
+            </a:r>
+          </a:p>
+          <a:p>
+            <a:r>
+              <a:rPr lang="nl-NL" dirty="0" err="1" smtClean="0"/>
+              <a:t>Everything</a:t>
+            </a:r>
+            <a:r>
+              <a:rPr lang="nl-NL" dirty="0" smtClean="0"/>
+              <a:t> is a </a:t>
+            </a:r>
+            <a:r>
+              <a:rPr lang="nl-NL" dirty="0" err="1" smtClean="0"/>
+              <a:t>methodcall</a:t>
+            </a:r>
+            <a:endParaRPr lang="nl-NL" dirty="0" smtClean="0"/>
+          </a:p>
+          <a:p>
+            <a:endParaRPr lang="nl-NL" dirty="0" smtClean="0"/>
+          </a:p>
+          <a:p>
+            <a:pPr marL="0" indent="0">
+              <a:buNone/>
+            </a:pPr>
             <a:endParaRPr lang="nl-BE" dirty="0"/>
           </a:p>
         </p:txBody>
@@ -4031,6 +4130,66 @@
           </a:p>
         </p:txBody>
       </p:sp>
+      <p:pic>
+        <p:nvPicPr>
+          <p:cNvPr id="6" name="Picture 5"/>
+          <p:cNvPicPr>
+            <a:picLocks noChangeAspect="1"/>
+          </p:cNvPicPr>
+          <p:nvPr/>
+        </p:nvPicPr>
+        <p:blipFill>
+          <a:blip r:embed="rId2">
+            <a:extLst>
+              <a:ext uri="{28A0092B-C50C-407E-A947-70E740481C1C}">
+                <a14:useLocalDpi xmlns:a14="http://schemas.microsoft.com/office/drawing/2010/main" val="0"/>
+              </a:ext>
+            </a:extLst>
+          </a:blip>
+          <a:stretch>
+            <a:fillRect/>
+          </a:stretch>
+        </p:blipFill>
+        <p:spPr>
+          <a:xfrm>
+            <a:off x="6537155" y="1315788"/>
+            <a:ext cx="4487903" cy="1985798"/>
+          </a:xfrm>
+          <a:prstGeom prst="rect">
+            <a:avLst/>
+          </a:prstGeom>
+        </p:spPr>
+      </p:pic>
+      <p:pic>
+        <p:nvPicPr>
+          <p:cNvPr id="7" name="Picture 6"/>
+          <p:cNvPicPr>
+            <a:picLocks noChangeAspect="1"/>
+          </p:cNvPicPr>
+          <p:nvPr/>
+        </p:nvPicPr>
+        <p:blipFill>
+          <a:blip r:embed="rId3">
+            <a:extLst>
+              <a:ext uri="{28A0092B-C50C-407E-A947-70E740481C1C}">
+                <a14:useLocalDpi xmlns:a14="http://schemas.microsoft.com/office/drawing/2010/main" val="0"/>
+              </a:ext>
+            </a:extLst>
+          </a:blip>
+          <a:stretch>
+            <a:fillRect/>
+          </a:stretch>
+        </p:blipFill>
+        <p:spPr>
+          <a:xfrm>
+            <a:off x="2510585" y="3397719"/>
+            <a:ext cx="8526378" cy="2870920"/>
+          </a:xfrm>
+          <a:prstGeom prst="rect">
+            <a:avLst/>
+          </a:prstGeom>
+        </p:spPr>
+      </p:pic>
     </p:spTree>
     <p:extLst>
       <p:ext uri="{BB962C8B-B14F-4D97-AF65-F5344CB8AC3E}">
@@ -4085,43 +4244,45 @@
           <a:p>
             <a:r>
               <a:rPr lang="nl-NL" dirty="0" smtClean="0"/>
-              <a:t>Opbouw van een document: </a:t>
-            </a:r>
-            <a:r>
-              <a:rPr lang="nl-NL" dirty="0" err="1" smtClean="0"/>
-              <a:t>nested</a:t>
-            </a:r>
-            <a:r>
-              <a:rPr lang="nl-NL" dirty="0" smtClean="0"/>
-              <a:t> </a:t>
-            </a:r>
-            <a:r>
-              <a:rPr lang="nl-NL" dirty="0" err="1" smtClean="0"/>
-              <a:t>methods</a:t>
+              <a:t>Building a document: </a:t>
+            </a:r>
+            <a:r>
+              <a:rPr lang="nl-NL" dirty="0" err="1" smtClean="0"/>
+              <a:t>result</a:t>
             </a:r>
             <a:endParaRPr lang="nl-BE" dirty="0"/>
           </a:p>
         </p:txBody>
       </p:sp>
-      <p:sp>
-        <p:nvSpPr>
-          <p:cNvPr id="3" name="Content Placeholder 2"/>
-          <p:cNvSpPr>
-            <a:spLocks noGrp="1"/>
-          </p:cNvSpPr>
+      <p:pic>
+        <p:nvPicPr>
+          <p:cNvPr id="6" name="Content Placeholder 5"/>
+          <p:cNvPicPr>
+            <a:picLocks noGrp="1" noChangeAspect="1"/>
+          </p:cNvPicPr>
           <p:nvPr>
             <p:ph idx="1"/>
           </p:nvPr>
-        </p:nvSpPr>
-        <p:spPr/>
-        <p:txBody>
-          <a:bodyPr/>
-          <a:lstStyle/>
-          <a:p>
-            <a:endParaRPr lang="nl-BE"/>
-          </a:p>
-        </p:txBody>
-      </p:sp>
+        </p:nvPicPr>
+        <p:blipFill>
+          <a:blip r:embed="rId2">
+            <a:extLst>
+              <a:ext uri="{28A0092B-C50C-407E-A947-70E740481C1C}">
+                <a14:useLocalDpi xmlns:a14="http://schemas.microsoft.com/office/drawing/2010/main" val="0"/>
+              </a:ext>
+            </a:extLst>
+          </a:blip>
+          <a:stretch>
+            <a:fillRect/>
+          </a:stretch>
+        </p:blipFill>
+        <p:spPr>
+          <a:xfrm>
+            <a:off x="3041679" y="1665204"/>
+            <a:ext cx="5723629" cy="4351338"/>
+          </a:xfrm>
+        </p:spPr>
+      </p:pic>
       <p:sp>
         <p:nvSpPr>
           <p:cNvPr id="4" name="Footer Placeholder 3"/>
@@ -4138,16 +4299,10 @@
           <a:lstStyle/>
           <a:p>
             <a:r>
-              <a:rPr lang="nl-BE" dirty="0" smtClean="0"/>
-              <a:t>Titouan Vervack</a:t>
-            </a:r>
-          </a:p>
-          <a:p>
-            <a:r>
-              <a:rPr lang="nl-BE" dirty="0" smtClean="0"/>
-              <a:t>Promotor: Professor Marko van Dooren</a:t>
-            </a:r>
-            <a:endParaRPr lang="nl-BE" dirty="0"/>
+              <a:rPr lang="nl-BE" smtClean="0"/>
+              <a:t>Titouan VervackPromoter: Professor Marko van Dooren</a:t>
+            </a:r>
+            <a:endParaRPr lang="nl-BE"/>
           </a:p>
         </p:txBody>
       </p:sp>
@@ -4177,20 +4332,13 @@
     </p:spTree>
     <p:extLst>
       <p:ext uri="{BB962C8B-B14F-4D97-AF65-F5344CB8AC3E}">
-        <p14:creationId xmlns:p14="http://schemas.microsoft.com/office/powerpoint/2010/main" val="1948563523"/>
+        <p14:creationId xmlns:p14="http://schemas.microsoft.com/office/powerpoint/2010/main" val="4214611046"/>
       </p:ext>
     </p:extLst>
   </p:cSld>
   <p:clrMapOvr>
     <a:masterClrMapping/>
   </p:clrMapOvr>
-  <p:timing>
-    <p:tnLst>
-      <p:par>
-        <p:cTn id="1" dur="indefinite" restart="never" nodeType="tmRoot"/>
-      </p:par>
-    </p:tnLst>
-  </p:timing>
 </p:sld>
 </file>
 
@@ -4228,7 +4376,15 @@
           <a:p>
             <a:r>
               <a:rPr lang="nl-NL" dirty="0" err="1" smtClean="0"/>
-              <a:t>Editability</a:t>
+              <a:t>Nested</a:t>
+            </a:r>
+            <a:r>
+              <a:rPr lang="nl-NL" dirty="0" smtClean="0"/>
+              <a:t> </a:t>
+            </a:r>
+            <a:r>
+              <a:rPr lang="nl-NL" dirty="0" err="1" smtClean="0"/>
+              <a:t>methods</a:t>
             </a:r>
             <a:endParaRPr lang="nl-BE" dirty="0"/>
           </a:p>
@@ -4250,8 +4406,32 @@
           <a:lstStyle/>
           <a:p>
             <a:r>
-              <a:rPr lang="nl-NL" dirty="0" smtClean="0"/>
-              <a:t>Toon aanpassingen door overerving</a:t>
+              <a:rPr lang="nl-NL" dirty="0" err="1" smtClean="0"/>
+              <a:t>Allow</a:t>
+            </a:r>
+            <a:r>
+              <a:rPr lang="nl-NL" dirty="0" smtClean="0"/>
+              <a:t> </a:t>
+            </a:r>
+            <a:r>
+              <a:rPr lang="nl-NL" dirty="0" err="1" smtClean="0"/>
+              <a:t>fo</a:t>
+            </a:r>
+            <a:r>
+              <a:rPr lang="nl-NL" dirty="0" err="1" smtClean="0"/>
+              <a:t>r</a:t>
+            </a:r>
+            <a:r>
+              <a:rPr lang="nl-NL" dirty="0" smtClean="0"/>
+              <a:t> nesting of </a:t>
+            </a:r>
+            <a:r>
+              <a:rPr lang="nl-NL" dirty="0" err="1" smtClean="0"/>
+              <a:t>the</a:t>
+            </a:r>
+            <a:r>
+              <a:rPr lang="nl-NL" dirty="0" smtClean="0"/>
+              <a:t> operator</a:t>
             </a:r>
             <a:endParaRPr lang="nl-BE" dirty="0"/>
           </a:p>
@@ -4309,10 +4489,97 @@
           </a:p>
         </p:txBody>
       </p:sp>
+      <p:pic>
+        <p:nvPicPr>
+          <p:cNvPr id="6" name="Picture 5"/>
+          <p:cNvPicPr>
+            <a:picLocks noChangeAspect="1"/>
+          </p:cNvPicPr>
+          <p:nvPr/>
+        </p:nvPicPr>
+        <p:blipFill rotWithShape="1">
+          <a:blip r:embed="rId2">
+            <a:extLst>
+              <a:ext uri="{28A0092B-C50C-407E-A947-70E740481C1C}">
+                <a14:useLocalDpi xmlns:a14="http://schemas.microsoft.com/office/drawing/2010/main" val="0"/>
+              </a:ext>
+            </a:extLst>
+          </a:blip>
+          <a:srcRect t="75830"/>
+          <a:stretch/>
+        </p:blipFill>
+        <p:spPr>
+          <a:xfrm>
+            <a:off x="6335305" y="1387641"/>
+            <a:ext cx="5102716" cy="1831710"/>
+          </a:xfrm>
+          <a:prstGeom prst="rect">
+            <a:avLst/>
+          </a:prstGeom>
+        </p:spPr>
+      </p:pic>
+      <p:pic>
+        <p:nvPicPr>
+          <p:cNvPr id="7" name="Picture 6"/>
+          <p:cNvPicPr>
+            <a:picLocks noChangeAspect="1"/>
+          </p:cNvPicPr>
+          <p:nvPr/>
+        </p:nvPicPr>
+        <p:blipFill rotWithShape="1">
+          <a:blip r:embed="rId3">
+            <a:extLst>
+              <a:ext uri="{28A0092B-C50C-407E-A947-70E740481C1C}">
+                <a14:useLocalDpi xmlns:a14="http://schemas.microsoft.com/office/drawing/2010/main" val="0"/>
+              </a:ext>
+            </a:extLst>
+          </a:blip>
+          <a:srcRect l="5889" t="48821"/>
+          <a:stretch/>
+        </p:blipFill>
+        <p:spPr>
+          <a:xfrm>
+            <a:off x="401052" y="3497179"/>
+            <a:ext cx="5065419" cy="1218864"/>
+          </a:xfrm>
+          <a:prstGeom prst="rect">
+            <a:avLst/>
+          </a:prstGeom>
+        </p:spPr>
+      </p:pic>
+      <p:pic>
+        <p:nvPicPr>
+          <p:cNvPr id="8" name="Picture 7"/>
+          <p:cNvPicPr>
+            <a:picLocks noChangeAspect="1"/>
+          </p:cNvPicPr>
+          <p:nvPr/>
+        </p:nvPicPr>
+        <p:blipFill rotWithShape="1">
+          <a:blip r:embed="rId4">
+            <a:extLst>
+              <a:ext uri="{28A0092B-C50C-407E-A947-70E740481C1C}">
+                <a14:useLocalDpi xmlns:a14="http://schemas.microsoft.com/office/drawing/2010/main" val="0"/>
+              </a:ext>
+            </a:extLst>
+          </a:blip>
+          <a:srcRect l="14205" t="40344" r="2823" b="26409"/>
+          <a:stretch/>
+        </p:blipFill>
+        <p:spPr>
+          <a:xfrm>
+            <a:off x="409074" y="4916904"/>
+            <a:ext cx="7074570" cy="954505"/>
+          </a:xfrm>
+          <a:prstGeom prst="rect">
+            <a:avLst/>
+          </a:prstGeom>
+        </p:spPr>
+      </p:pic>
     </p:spTree>
     <p:extLst>
       <p:ext uri="{BB962C8B-B14F-4D97-AF65-F5344CB8AC3E}">
-        <p14:creationId xmlns:p14="http://schemas.microsoft.com/office/powerpoint/2010/main" val="3285089664"/>
+        <p14:creationId xmlns:p14="http://schemas.microsoft.com/office/powerpoint/2010/main" val="1948563523"/>
       </p:ext>
     </p:extLst>
   </p:cSld>
@@ -4363,7 +4630,7 @@
           <a:p>
             <a:r>
               <a:rPr lang="nl-NL" dirty="0" err="1" smtClean="0"/>
-              <a:t>Customizability</a:t>
+              <a:t>Customisability</a:t>
             </a:r>
             <a:r>
               <a:rPr lang="nl-NL" dirty="0" smtClean="0"/>
@@ -4371,31 +4638,41 @@
             </a:r>
             <a:r>
               <a:rPr lang="nl-NL" dirty="0" err="1" smtClean="0"/>
-              <a:t>use</a:t>
+              <a:t>inheritance</a:t>
             </a:r>
             <a:endParaRPr lang="nl-BE" dirty="0"/>
           </a:p>
         </p:txBody>
       </p:sp>
-      <p:sp>
-        <p:nvSpPr>
-          <p:cNvPr id="3" name="Content Placeholder 2"/>
-          <p:cNvSpPr>
-            <a:spLocks noGrp="1"/>
-          </p:cNvSpPr>
+      <p:pic>
+        <p:nvPicPr>
+          <p:cNvPr id="6" name="Content Placeholder 5"/>
+          <p:cNvPicPr>
+            <a:picLocks noGrp="1" noChangeAspect="1"/>
+          </p:cNvPicPr>
           <p:nvPr>
             <p:ph idx="1"/>
           </p:nvPr>
-        </p:nvSpPr>
-        <p:spPr/>
-        <p:txBody>
-          <a:bodyPr/>
-          <a:lstStyle/>
-          <a:p>
-            <a:endParaRPr lang="nl-BE" dirty="0"/>
-          </a:p>
-        </p:txBody>
-      </p:sp>
+        </p:nvPicPr>
+        <p:blipFill>
+          <a:blip r:embed="rId2">
+            <a:extLst>
+              <a:ext uri="{28A0092B-C50C-407E-A947-70E740481C1C}">
+                <a14:useLocalDpi xmlns:a14="http://schemas.microsoft.com/office/drawing/2010/main" val="0"/>
+              </a:ext>
+            </a:extLst>
+          </a:blip>
+          <a:stretch>
+            <a:fillRect/>
+          </a:stretch>
+        </p:blipFill>
+        <p:spPr>
+          <a:xfrm>
+            <a:off x="542101" y="1360446"/>
+            <a:ext cx="4610743" cy="2410161"/>
+          </a:xfrm>
+        </p:spPr>
+      </p:pic>
       <p:sp>
         <p:nvSpPr>
           <p:cNvPr id="4" name="Footer Placeholder 3"/>
@@ -4448,10 +4725,70 @@
           </a:p>
         </p:txBody>
       </p:sp>
+      <p:pic>
+        <p:nvPicPr>
+          <p:cNvPr id="7" name="Picture 6"/>
+          <p:cNvPicPr>
+            <a:picLocks noChangeAspect="1"/>
+          </p:cNvPicPr>
+          <p:nvPr/>
+        </p:nvPicPr>
+        <p:blipFill>
+          <a:blip r:embed="rId3">
+            <a:extLst>
+              <a:ext uri="{28A0092B-C50C-407E-A947-70E740481C1C}">
+                <a14:useLocalDpi xmlns:a14="http://schemas.microsoft.com/office/drawing/2010/main" val="0"/>
+              </a:ext>
+            </a:extLst>
+          </a:blip>
+          <a:stretch>
+            <a:fillRect/>
+          </a:stretch>
+        </p:blipFill>
+        <p:spPr>
+          <a:xfrm>
+            <a:off x="294396" y="3987134"/>
+            <a:ext cx="5410955" cy="2381582"/>
+          </a:xfrm>
+          <a:prstGeom prst="rect">
+            <a:avLst/>
+          </a:prstGeom>
+        </p:spPr>
+      </p:pic>
+      <p:pic>
+        <p:nvPicPr>
+          <p:cNvPr id="8" name="Picture 7"/>
+          <p:cNvPicPr>
+            <a:picLocks noChangeAspect="1"/>
+          </p:cNvPicPr>
+          <p:nvPr/>
+        </p:nvPicPr>
+        <p:blipFill>
+          <a:blip r:embed="rId4">
+            <a:extLst>
+              <a:ext uri="{28A0092B-C50C-407E-A947-70E740481C1C}">
+                <a14:useLocalDpi xmlns:a14="http://schemas.microsoft.com/office/drawing/2010/main" val="0"/>
+              </a:ext>
+            </a:extLst>
+          </a:blip>
+          <a:stretch>
+            <a:fillRect/>
+          </a:stretch>
+        </p:blipFill>
+        <p:spPr>
+          <a:xfrm>
+            <a:off x="6272464" y="1490165"/>
+            <a:ext cx="4526296" cy="4549687"/>
+          </a:xfrm>
+          <a:prstGeom prst="rect">
+            <a:avLst/>
+          </a:prstGeom>
+        </p:spPr>
+      </p:pic>
     </p:spTree>
     <p:extLst>
       <p:ext uri="{BB962C8B-B14F-4D97-AF65-F5344CB8AC3E}">
-        <p14:creationId xmlns:p14="http://schemas.microsoft.com/office/powerpoint/2010/main" val="2648100179"/>
+        <p14:creationId xmlns:p14="http://schemas.microsoft.com/office/powerpoint/2010/main" val="3285089664"/>
       </p:ext>
     </p:extLst>
   </p:cSld>
@@ -4502,40 +4839,21 @@
           <a:p>
             <a:r>
               <a:rPr lang="nl-NL" dirty="0" err="1" smtClean="0"/>
-              <a:t>Customizability</a:t>
-            </a:r>
-            <a:r>
-              <a:rPr lang="nl-NL" dirty="0" smtClean="0"/>
-              <a:t>/</a:t>
-            </a:r>
-            <a:r>
-              <a:rPr lang="nl-NL" dirty="0" err="1" smtClean="0"/>
-              <a:t>macros</a:t>
-            </a:r>
-            <a:r>
-              <a:rPr lang="nl-NL" dirty="0" smtClean="0"/>
-              <a:t>: code uitvoeren</a:t>
+              <a:t>Customisability</a:t>
+            </a:r>
+            <a:r>
+              <a:rPr lang="nl-NL" dirty="0" smtClean="0"/>
+              <a:t>: </a:t>
+            </a:r>
+            <a:r>
+              <a:rPr lang="nl-NL" dirty="0" err="1" smtClean="0"/>
+              <a:t>executing</a:t>
+            </a:r>
+            <a:r>
+              <a:rPr lang="nl-NL" dirty="0" smtClean="0"/>
+              <a:t> code</a:t>
             </a:r>
             <a:endParaRPr lang="nl-BE" dirty="0"/>
-          </a:p>
-        </p:txBody>
-      </p:sp>
-      <p:sp>
-        <p:nvSpPr>
-          <p:cNvPr id="3" name="Content Placeholder 2"/>
-          <p:cNvSpPr>
-            <a:spLocks noGrp="1"/>
-          </p:cNvSpPr>
-          <p:nvPr>
-            <p:ph idx="1"/>
-          </p:nvPr>
-        </p:nvSpPr>
-        <p:spPr/>
-        <p:txBody>
-          <a:bodyPr/>
-          <a:lstStyle/>
-          <a:p>
-            <a:endParaRPr lang="nl-BE"/>
           </a:p>
         </p:txBody>
       </p:sp>
@@ -4591,6 +4909,65 @@
           </a:p>
         </p:txBody>
       </p:sp>
+      <p:pic>
+        <p:nvPicPr>
+          <p:cNvPr id="11" name="Content Placeholder 10"/>
+          <p:cNvPicPr>
+            <a:picLocks noGrp="1" noChangeAspect="1"/>
+          </p:cNvPicPr>
+          <p:nvPr>
+            <p:ph idx="1"/>
+          </p:nvPr>
+        </p:nvPicPr>
+        <p:blipFill>
+          <a:blip r:embed="rId2">
+            <a:extLst>
+              <a:ext uri="{28A0092B-C50C-407E-A947-70E740481C1C}">
+                <a14:useLocalDpi xmlns:a14="http://schemas.microsoft.com/office/drawing/2010/main" val="0"/>
+              </a:ext>
+            </a:extLst>
+          </a:blip>
+          <a:stretch>
+            <a:fillRect/>
+          </a:stretch>
+        </p:blipFill>
+        <p:spPr>
+          <a:xfrm>
+            <a:off x="3890205" y="1430097"/>
+            <a:ext cx="3857499" cy="2045022"/>
+          </a:xfrm>
+        </p:spPr>
+      </p:pic>
+      <p:pic>
+        <p:nvPicPr>
+          <p:cNvPr id="12" name="Picture 11"/>
+          <p:cNvPicPr>
+            <a:picLocks noChangeAspect="1"/>
+          </p:cNvPicPr>
+          <p:nvPr/>
+        </p:nvPicPr>
+        <p:blipFill>
+          <a:blip r:embed="rId3">
+            <a:extLst>
+              <a:ext uri="{28A0092B-C50C-407E-A947-70E740481C1C}">
+                <a14:useLocalDpi xmlns:a14="http://schemas.microsoft.com/office/drawing/2010/main" val="0"/>
+              </a:ext>
+            </a:extLst>
+          </a:blip>
+          <a:stretch>
+            <a:fillRect/>
+          </a:stretch>
+        </p:blipFill>
+        <p:spPr>
+          <a:xfrm>
+            <a:off x="1570855" y="3630973"/>
+            <a:ext cx="9024952" cy="2681595"/>
+          </a:xfrm>
+          <a:prstGeom prst="rect">
+            <a:avLst/>
+          </a:prstGeom>
+        </p:spPr>
+      </p:pic>
     </p:spTree>
     <p:extLst>
       <p:ext uri="{BB962C8B-B14F-4D97-AF65-F5344CB8AC3E}">
@@ -4645,32 +5022,21 @@
           <a:p>
             <a:r>
               <a:rPr lang="nl-NL" dirty="0" err="1" smtClean="0"/>
-              <a:t>Customizability</a:t>
-            </a:r>
-            <a:r>
-              <a:rPr lang="nl-NL" dirty="0" smtClean="0"/>
-              <a:t>: code uitvoeren waar iets uitkomt</a:t>
+              <a:t>Customisability</a:t>
+            </a:r>
+            <a:r>
+              <a:rPr lang="nl-NL" dirty="0" smtClean="0"/>
+              <a:t>: </a:t>
+            </a:r>
+            <a:r>
+              <a:rPr lang="nl-NL" dirty="0" err="1" smtClean="0"/>
+              <a:t>executing</a:t>
+            </a:r>
+            <a:r>
+              <a:rPr lang="nl-NL" dirty="0" smtClean="0"/>
+              <a:t> code</a:t>
             </a:r>
             <a:endParaRPr lang="nl-BE" dirty="0"/>
-          </a:p>
-        </p:txBody>
-      </p:sp>
-      <p:sp>
-        <p:nvSpPr>
-          <p:cNvPr id="3" name="Content Placeholder 2"/>
-          <p:cNvSpPr>
-            <a:spLocks noGrp="1"/>
-          </p:cNvSpPr>
-          <p:nvPr>
-            <p:ph idx="1"/>
-          </p:nvPr>
-        </p:nvSpPr>
-        <p:spPr/>
-        <p:txBody>
-          <a:bodyPr/>
-          <a:lstStyle/>
-          <a:p>
-            <a:endParaRPr lang="nl-BE"/>
           </a:p>
         </p:txBody>
       </p:sp>
@@ -4722,6 +5088,161 @@
               <a:rPr lang="nl-BE" smtClean="0"/>
               <a:t>16</a:t>
             </a:fld>
+            <a:endParaRPr lang="nl-BE"/>
+          </a:p>
+        </p:txBody>
+      </p:sp>
+      <p:pic>
+        <p:nvPicPr>
+          <p:cNvPr id="11" name="Picture 10"/>
+          <p:cNvPicPr>
+            <a:picLocks noChangeAspect="1"/>
+          </p:cNvPicPr>
+          <p:nvPr/>
+        </p:nvPicPr>
+        <p:blipFill rotWithShape="1">
+          <a:blip r:embed="rId2">
+            <a:extLst>
+              <a:ext uri="{28A0092B-C50C-407E-A947-70E740481C1C}">
+                <a14:useLocalDpi xmlns:a14="http://schemas.microsoft.com/office/drawing/2010/main" val="0"/>
+              </a:ext>
+            </a:extLst>
+          </a:blip>
+          <a:srcRect t="58423" r="52526"/>
+          <a:stretch/>
+        </p:blipFill>
+        <p:spPr>
+          <a:xfrm>
+            <a:off x="367699" y="4267199"/>
+            <a:ext cx="4284513" cy="1114926"/>
+          </a:xfrm>
+          <a:prstGeom prst="rect">
+            <a:avLst/>
+          </a:prstGeom>
+        </p:spPr>
+      </p:pic>
+      <p:pic>
+        <p:nvPicPr>
+          <p:cNvPr id="12" name="Picture 11"/>
+          <p:cNvPicPr>
+            <a:picLocks noChangeAspect="1"/>
+          </p:cNvPicPr>
+          <p:nvPr/>
+        </p:nvPicPr>
+        <p:blipFill rotWithShape="1">
+          <a:blip r:embed="rId3">
+            <a:extLst>
+              <a:ext uri="{28A0092B-C50C-407E-A947-70E740481C1C}">
+                <a14:useLocalDpi xmlns:a14="http://schemas.microsoft.com/office/drawing/2010/main" val="0"/>
+              </a:ext>
+            </a:extLst>
+          </a:blip>
+          <a:srcRect t="69641" r="56316"/>
+          <a:stretch/>
+        </p:blipFill>
+        <p:spPr>
+          <a:xfrm>
+            <a:off x="6906126" y="4355431"/>
+            <a:ext cx="5029194" cy="907318"/>
+          </a:xfrm>
+          <a:prstGeom prst="rect">
+            <a:avLst/>
+          </a:prstGeom>
+        </p:spPr>
+      </p:pic>
+      <p:pic>
+        <p:nvPicPr>
+          <p:cNvPr id="15" name="Content Placeholder 14"/>
+          <p:cNvPicPr>
+            <a:picLocks noGrp="1" noChangeAspect="1"/>
+          </p:cNvPicPr>
+          <p:nvPr>
+            <p:ph idx="1"/>
+          </p:nvPr>
+        </p:nvPicPr>
+        <p:blipFill rotWithShape="1">
+          <a:blip r:embed="rId4">
+            <a:extLst>
+              <a:ext uri="{28A0092B-C50C-407E-A947-70E740481C1C}">
+                <a14:useLocalDpi xmlns:a14="http://schemas.microsoft.com/office/drawing/2010/main" val="0"/>
+              </a:ext>
+            </a:extLst>
+          </a:blip>
+          <a:srcRect t="56824"/>
+          <a:stretch/>
+        </p:blipFill>
+        <p:spPr>
+          <a:xfrm>
+            <a:off x="6906121" y="2975812"/>
+            <a:ext cx="3780298" cy="856325"/>
+          </a:xfrm>
+        </p:spPr>
+      </p:pic>
+      <p:pic>
+        <p:nvPicPr>
+          <p:cNvPr id="14" name="Content Placeholder 10"/>
+          <p:cNvPicPr>
+            <a:picLocks noChangeAspect="1"/>
+          </p:cNvPicPr>
+          <p:nvPr/>
+        </p:nvPicPr>
+        <p:blipFill rotWithShape="1">
+          <a:blip r:embed="rId5">
+            <a:extLst>
+              <a:ext uri="{28A0092B-C50C-407E-A947-70E740481C1C}">
+                <a14:useLocalDpi xmlns:a14="http://schemas.microsoft.com/office/drawing/2010/main" val="0"/>
+              </a:ext>
+            </a:extLst>
+          </a:blip>
+          <a:srcRect t="56758"/>
+          <a:stretch/>
+        </p:blipFill>
+        <p:spPr>
+          <a:xfrm>
+            <a:off x="778038" y="2935704"/>
+            <a:ext cx="3857499" cy="884319"/>
+          </a:xfrm>
+          <a:prstGeom prst="rect">
+            <a:avLst/>
+          </a:prstGeom>
+        </p:spPr>
+      </p:pic>
+      <p:sp>
+        <p:nvSpPr>
+          <p:cNvPr id="16" name="Right Arrow 15"/>
+          <p:cNvSpPr/>
+          <p:nvPr/>
+        </p:nvSpPr>
+        <p:spPr>
+          <a:xfrm>
+            <a:off x="5013158" y="3866148"/>
+            <a:ext cx="1652331" cy="385011"/>
+          </a:xfrm>
+          <a:prstGeom prst="rightArrow">
+            <a:avLst/>
+          </a:prstGeom>
+        </p:spPr>
+        <p:style>
+          <a:lnRef idx="2">
+            <a:schemeClr val="accent1">
+              <a:shade val="50000"/>
+            </a:schemeClr>
+          </a:lnRef>
+          <a:fillRef idx="1">
+            <a:schemeClr val="accent1"/>
+          </a:fillRef>
+          <a:effectRef idx="0">
+            <a:schemeClr val="accent1"/>
+          </a:effectRef>
+          <a:fontRef idx="minor">
+            <a:schemeClr val="lt1"/>
+          </a:fontRef>
+        </p:style>
+        <p:txBody>
+          <a:bodyPr rtlCol="0" anchor="ctr"/>
+          <a:lstStyle/>
+          <a:p>
+            <a:pPr algn="ctr"/>
             <a:endParaRPr lang="nl-BE"/>
           </a:p>
         </p:txBody>
@@ -4780,47 +5301,53 @@
           <a:p>
             <a:r>
               <a:rPr lang="nl-NL" dirty="0" err="1" smtClean="0"/>
-              <a:t>Macros</a:t>
-            </a:r>
-            <a:r>
-              <a:rPr lang="nl-NL" dirty="0" smtClean="0"/>
-              <a:t>: </a:t>
-            </a:r>
-            <a:r>
-              <a:rPr lang="nl-NL" dirty="0" err="1" smtClean="0"/>
-              <a:t>custom</a:t>
-            </a:r>
-            <a:r>
-              <a:rPr lang="nl-NL" dirty="0" smtClean="0"/>
-              <a:t> </a:t>
-            </a:r>
-            <a:r>
-              <a:rPr lang="nl-NL" dirty="0" err="1" smtClean="0"/>
-              <a:t>commands</a:t>
+              <a:t>Add</a:t>
+            </a:r>
+            <a:r>
+              <a:rPr lang="nl-NL" dirty="0" smtClean="0"/>
+              <a:t> content </a:t>
+            </a:r>
+            <a:r>
+              <a:rPr lang="nl-NL" dirty="0" err="1" smtClean="0"/>
+              <a:t>through</a:t>
+            </a:r>
+            <a:r>
+              <a:rPr lang="nl-NL" dirty="0" smtClean="0"/>
+              <a:t> code</a:t>
             </a:r>
             <a:endParaRPr lang="nl-BE" dirty="0"/>
           </a:p>
         </p:txBody>
       </p:sp>
-      <p:sp>
-        <p:nvSpPr>
-          <p:cNvPr id="3" name="Content Placeholder 2"/>
-          <p:cNvSpPr>
-            <a:spLocks noGrp="1"/>
-          </p:cNvSpPr>
+      <p:pic>
+        <p:nvPicPr>
+          <p:cNvPr id="6" name="Content Placeholder 5"/>
+          <p:cNvPicPr>
+            <a:picLocks noGrp="1" noChangeAspect="1"/>
+          </p:cNvPicPr>
           <p:nvPr>
             <p:ph idx="1"/>
           </p:nvPr>
-        </p:nvSpPr>
-        <p:spPr/>
-        <p:txBody>
-          <a:bodyPr/>
-          <a:lstStyle/>
-          <a:p>
-            <a:endParaRPr lang="nl-BE"/>
-          </a:p>
-        </p:txBody>
-      </p:sp>
+        </p:nvPicPr>
+        <p:blipFill>
+          <a:blip r:embed="rId2">
+            <a:extLst>
+              <a:ext uri="{28A0092B-C50C-407E-A947-70E740481C1C}">
+                <a14:useLocalDpi xmlns:a14="http://schemas.microsoft.com/office/drawing/2010/main" val="0"/>
+              </a:ext>
+            </a:extLst>
+          </a:blip>
+          <a:stretch>
+            <a:fillRect/>
+          </a:stretch>
+        </p:blipFill>
+        <p:spPr>
+          <a:xfrm>
+            <a:off x="1161602" y="1644977"/>
+            <a:ext cx="2810267" cy="1905266"/>
+          </a:xfrm>
+        </p:spPr>
+      </p:pic>
       <p:sp>
         <p:nvSpPr>
           <p:cNvPr id="4" name="Footer Placeholder 3"/>
@@ -4873,6 +5400,66 @@
           </a:p>
         </p:txBody>
       </p:sp>
+      <p:pic>
+        <p:nvPicPr>
+          <p:cNvPr id="7" name="Picture 6"/>
+          <p:cNvPicPr>
+            <a:picLocks noChangeAspect="1"/>
+          </p:cNvPicPr>
+          <p:nvPr/>
+        </p:nvPicPr>
+        <p:blipFill>
+          <a:blip r:embed="rId3">
+            <a:extLst>
+              <a:ext uri="{28A0092B-C50C-407E-A947-70E740481C1C}">
+                <a14:useLocalDpi xmlns:a14="http://schemas.microsoft.com/office/drawing/2010/main" val="0"/>
+              </a:ext>
+            </a:extLst>
+          </a:blip>
+          <a:stretch>
+            <a:fillRect/>
+          </a:stretch>
+        </p:blipFill>
+        <p:spPr>
+          <a:xfrm>
+            <a:off x="1150436" y="3902340"/>
+            <a:ext cx="8383170" cy="2181529"/>
+          </a:xfrm>
+          <a:prstGeom prst="rect">
+            <a:avLst/>
+          </a:prstGeom>
+        </p:spPr>
+      </p:pic>
+      <p:pic>
+        <p:nvPicPr>
+          <p:cNvPr id="8" name="Picture 7"/>
+          <p:cNvPicPr>
+            <a:picLocks noChangeAspect="1"/>
+          </p:cNvPicPr>
+          <p:nvPr/>
+        </p:nvPicPr>
+        <p:blipFill>
+          <a:blip r:embed="rId4">
+            <a:extLst>
+              <a:ext uri="{28A0092B-C50C-407E-A947-70E740481C1C}">
+                <a14:useLocalDpi xmlns:a14="http://schemas.microsoft.com/office/drawing/2010/main" val="0"/>
+              </a:ext>
+            </a:extLst>
+          </a:blip>
+          <a:stretch>
+            <a:fillRect/>
+          </a:stretch>
+        </p:blipFill>
+        <p:spPr>
+          <a:xfrm>
+            <a:off x="7537604" y="1137445"/>
+            <a:ext cx="2275655" cy="2608388"/>
+          </a:xfrm>
+          <a:prstGeom prst="rect">
+            <a:avLst/>
+          </a:prstGeom>
+        </p:spPr>
+      </p:pic>
     </p:spTree>
     <p:extLst>
       <p:ext uri="{BB962C8B-B14F-4D97-AF65-F5344CB8AC3E}">
@@ -4927,103 +5514,49 @@
           <a:p>
             <a:r>
               <a:rPr lang="nl-NL" dirty="0" err="1" smtClean="0"/>
-              <a:t>Future</a:t>
-            </a:r>
-            <a:r>
-              <a:rPr lang="nl-NL" dirty="0" smtClean="0"/>
-              <a:t> </a:t>
-            </a:r>
-            <a:r>
-              <a:rPr lang="nl-NL" dirty="0" err="1" smtClean="0"/>
-              <a:t>work</a:t>
-            </a:r>
-            <a:r>
-              <a:rPr lang="nl-NL" dirty="0" smtClean="0"/>
-              <a:t> </a:t>
-            </a:r>
-            <a:r>
-              <a:rPr lang="nl-NL" dirty="0" err="1" smtClean="0"/>
-              <a:t>before</a:t>
-            </a:r>
-            <a:r>
-              <a:rPr lang="nl-NL" dirty="0" smtClean="0"/>
-              <a:t> hand in</a:t>
+              <a:t>Customisability</a:t>
+            </a:r>
+            <a:r>
+              <a:rPr lang="nl-NL" dirty="0" smtClean="0"/>
+              <a:t>: </a:t>
+            </a:r>
+            <a:r>
+              <a:rPr lang="nl-NL" dirty="0" err="1" smtClean="0"/>
+              <a:t>use</a:t>
             </a:r>
             <a:endParaRPr lang="nl-BE" dirty="0"/>
           </a:p>
         </p:txBody>
       </p:sp>
-      <p:sp>
-        <p:nvSpPr>
-          <p:cNvPr id="3" name="Content Placeholder 2"/>
-          <p:cNvSpPr>
-            <a:spLocks noGrp="1"/>
-          </p:cNvSpPr>
+      <p:pic>
+        <p:nvPicPr>
+          <p:cNvPr id="6" name="Content Placeholder 5"/>
+          <p:cNvPicPr>
+            <a:picLocks noGrp="1" noChangeAspect="1"/>
+          </p:cNvPicPr>
           <p:nvPr>
             <p:ph idx="1"/>
           </p:nvPr>
-        </p:nvSpPr>
-        <p:spPr/>
-        <p:txBody>
-          <a:bodyPr/>
-          <a:lstStyle/>
-          <a:p>
-            <a:r>
-              <a:rPr lang="nl-NL" dirty="0" err="1" smtClean="0"/>
-              <a:t>Surround</a:t>
-            </a:r>
-            <a:r>
-              <a:rPr lang="nl-NL" dirty="0" smtClean="0"/>
-              <a:t> methodes</a:t>
-            </a:r>
-            <a:endParaRPr lang="nl-BE" dirty="0" smtClean="0"/>
-          </a:p>
-          <a:p>
-            <a:r>
-              <a:rPr lang="nl-NL" dirty="0" smtClean="0"/>
-              <a:t>Verdere controles op statische typering</a:t>
-            </a:r>
-          </a:p>
-          <a:p>
-            <a:r>
-              <a:rPr lang="nl-NL" dirty="0" smtClean="0"/>
-              <a:t>Invoeren van meer documentclasses (</a:t>
-            </a:r>
-            <a:r>
-              <a:rPr lang="nl-NL" dirty="0" err="1" smtClean="0"/>
-              <a:t>article</a:t>
-            </a:r>
-            <a:r>
-              <a:rPr lang="nl-NL" dirty="0" smtClean="0"/>
-              <a:t>, letter, </a:t>
-            </a:r>
-            <a:r>
-              <a:rPr lang="nl-NL" dirty="0" err="1" smtClean="0"/>
-              <a:t>book</a:t>
-            </a:r>
-            <a:r>
-              <a:rPr lang="nl-NL" dirty="0" smtClean="0"/>
-              <a:t>,…)</a:t>
-            </a:r>
-          </a:p>
-          <a:p>
-            <a:r>
-              <a:rPr lang="nl-NL" dirty="0" smtClean="0"/>
-              <a:t>Slideshows</a:t>
-            </a:r>
-          </a:p>
-          <a:p>
-            <a:r>
-              <a:rPr lang="nl-NL" dirty="0" err="1" smtClean="0"/>
-              <a:t>Inclusions</a:t>
-            </a:r>
-            <a:endParaRPr lang="nl-NL" dirty="0" smtClean="0"/>
-          </a:p>
-          <a:p>
-            <a:endParaRPr lang="nl-NL" dirty="0" smtClean="0"/>
-          </a:p>
-        </p:txBody>
-      </p:sp>
+        </p:nvPicPr>
+        <p:blipFill>
+          <a:blip r:embed="rId2">
+            <a:extLst>
+              <a:ext uri="{28A0092B-C50C-407E-A947-70E740481C1C}">
+                <a14:useLocalDpi xmlns:a14="http://schemas.microsoft.com/office/drawing/2010/main" val="0"/>
+              </a:ext>
+            </a:extLst>
+          </a:blip>
+          <a:stretch>
+            <a:fillRect/>
+          </a:stretch>
+        </p:blipFill>
+        <p:spPr>
+          <a:xfrm>
+            <a:off x="1049351" y="1663691"/>
+            <a:ext cx="2876951" cy="1676634"/>
+          </a:xfrm>
+        </p:spPr>
+      </p:pic>
       <p:sp>
         <p:nvSpPr>
           <p:cNvPr id="4" name="Footer Placeholder 3"/>
@@ -5076,10 +5609,100 @@
           </a:p>
         </p:txBody>
       </p:sp>
+      <p:pic>
+        <p:nvPicPr>
+          <p:cNvPr id="7" name="Picture 6"/>
+          <p:cNvPicPr>
+            <a:picLocks noChangeAspect="1"/>
+          </p:cNvPicPr>
+          <p:nvPr/>
+        </p:nvPicPr>
+        <p:blipFill>
+          <a:blip r:embed="rId3">
+            <a:extLst>
+              <a:ext uri="{28A0092B-C50C-407E-A947-70E740481C1C}">
+                <a14:useLocalDpi xmlns:a14="http://schemas.microsoft.com/office/drawing/2010/main" val="0"/>
+              </a:ext>
+            </a:extLst>
+          </a:blip>
+          <a:stretch>
+            <a:fillRect/>
+          </a:stretch>
+        </p:blipFill>
+        <p:spPr>
+          <a:xfrm>
+            <a:off x="1491049" y="3778747"/>
+            <a:ext cx="2175520" cy="2280314"/>
+          </a:xfrm>
+          <a:prstGeom prst="rect">
+            <a:avLst/>
+          </a:prstGeom>
+        </p:spPr>
+      </p:pic>
+      <p:pic>
+        <p:nvPicPr>
+          <p:cNvPr id="8" name="Picture 7"/>
+          <p:cNvPicPr>
+            <a:picLocks noChangeAspect="1"/>
+          </p:cNvPicPr>
+          <p:nvPr/>
+        </p:nvPicPr>
+        <p:blipFill>
+          <a:blip r:embed="rId4">
+            <a:extLst>
+              <a:ext uri="{28A0092B-C50C-407E-A947-70E740481C1C}">
+                <a14:useLocalDpi xmlns:a14="http://schemas.microsoft.com/office/drawing/2010/main" val="0"/>
+              </a:ext>
+            </a:extLst>
+          </a:blip>
+          <a:stretch>
+            <a:fillRect/>
+          </a:stretch>
+        </p:blipFill>
+        <p:spPr>
+          <a:xfrm>
+            <a:off x="6343134" y="1581915"/>
+            <a:ext cx="4364440" cy="1839103"/>
+          </a:xfrm>
+          <a:prstGeom prst="rect">
+            <a:avLst/>
+          </a:prstGeom>
+        </p:spPr>
+      </p:pic>
+      <p:pic>
+        <p:nvPicPr>
+          <p:cNvPr id="9" name="Picture 8"/>
+          <p:cNvPicPr>
+            <a:picLocks noChangeAspect="1"/>
+          </p:cNvPicPr>
+          <p:nvPr/>
+        </p:nvPicPr>
+        <p:blipFill>
+          <a:blip r:embed="rId5">
+            <a:extLst>
+              <a:ext uri="{28A0092B-C50C-407E-A947-70E740481C1C}">
+                <a14:useLocalDpi xmlns:a14="http://schemas.microsoft.com/office/drawing/2010/main" val="0"/>
+              </a:ext>
+            </a:extLst>
+          </a:blip>
+          <a:stretch>
+            <a:fillRect/>
+          </a:stretch>
+        </p:blipFill>
+        <p:spPr>
+          <a:xfrm>
+            <a:off x="7208107" y="3742130"/>
+            <a:ext cx="2382047" cy="2477553"/>
+          </a:xfrm>
+          <a:prstGeom prst="rect">
+            <a:avLst/>
+          </a:prstGeom>
+        </p:spPr>
+      </p:pic>
     </p:spTree>
     <p:extLst>
       <p:ext uri="{BB962C8B-B14F-4D97-AF65-F5344CB8AC3E}">
-        <p14:creationId xmlns:p14="http://schemas.microsoft.com/office/powerpoint/2010/main" val="1338530883"/>
+        <p14:creationId xmlns:p14="http://schemas.microsoft.com/office/powerpoint/2010/main" val="2648100179"/>
       </p:ext>
     </p:extLst>
   </p:cSld>
@@ -5142,7 +5765,15 @@
             </a:r>
             <a:r>
               <a:rPr lang="nl-NL" dirty="0" smtClean="0"/>
-              <a:t>	</a:t>
+              <a:t> </a:t>
+            </a:r>
+            <a:r>
+              <a:rPr lang="nl-NL" dirty="0" err="1" smtClean="0"/>
+              <a:t>before</a:t>
+            </a:r>
+            <a:r>
+              <a:rPr lang="nl-NL" dirty="0" smtClean="0"/>
+              <a:t> hand in</a:t>
             </a:r>
             <a:endParaRPr lang="nl-BE" dirty="0"/>
           </a:p>
@@ -5160,41 +5791,138 @@
         </p:nvSpPr>
         <p:spPr/>
         <p:txBody>
-          <a:bodyPr/>
-          <a:lstStyle/>
-          <a:p>
-            <a:r>
-              <a:rPr lang="nl-NL" dirty="0" smtClean="0"/>
-              <a:t>Native output naar </a:t>
-            </a:r>
-            <a:r>
-              <a:rPr lang="nl-NL" smtClean="0"/>
-              <a:t>talen </a:t>
-            </a:r>
-            <a:r>
-              <a:rPr lang="nl-NL" smtClean="0"/>
-              <a:t>ander </a:t>
-            </a:r>
-            <a:r>
-              <a:rPr lang="nl-NL" dirty="0" smtClean="0"/>
-              <a:t>dan latex</a:t>
-            </a:r>
-          </a:p>
-          <a:p>
-            <a:r>
-              <a:rPr lang="nl-NL" dirty="0" smtClean="0"/>
-              <a:t>Verdere adoptie van </a:t>
-            </a:r>
-            <a:r>
-              <a:rPr lang="nl-NL" dirty="0" err="1" smtClean="0"/>
-              <a:t>vaakgebruikte</a:t>
-            </a:r>
-            <a:r>
-              <a:rPr lang="nl-NL" dirty="0" smtClean="0"/>
-              <a:t> latex packages</a:t>
-            </a:r>
-          </a:p>
-          <a:p>
+          <a:bodyPr>
+            <a:normAutofit lnSpcReduction="10000"/>
+          </a:bodyPr>
+          <a:lstStyle/>
+          <a:p>
+            <a:r>
+              <a:rPr lang="nl-NL" dirty="0" err="1" smtClean="0"/>
+              <a:t>Inclusions</a:t>
+            </a:r>
+            <a:endParaRPr lang="nl-NL" dirty="0" smtClean="0"/>
+          </a:p>
+          <a:p>
+            <a:endParaRPr lang="nl-NL" dirty="0"/>
+          </a:p>
+          <a:p>
+            <a:r>
+              <a:rPr lang="nl-NL" dirty="0" smtClean="0"/>
+              <a:t>Slideshows</a:t>
+            </a:r>
+          </a:p>
+          <a:p>
+            <a:endParaRPr lang="nl-NL" dirty="0" smtClean="0"/>
+          </a:p>
+          <a:p>
+            <a:r>
+              <a:rPr lang="nl-NL" dirty="0" err="1"/>
+              <a:t>Surround</a:t>
+            </a:r>
+            <a:r>
+              <a:rPr lang="nl-NL" dirty="0"/>
+              <a:t> methodes</a:t>
+            </a:r>
+          </a:p>
+          <a:p>
+            <a:endParaRPr lang="nl-NL" dirty="0" smtClean="0"/>
+          </a:p>
+          <a:p>
+            <a:r>
+              <a:rPr lang="nl-NL" dirty="0" err="1" smtClean="0"/>
+              <a:t>Further</a:t>
+            </a:r>
+            <a:r>
+              <a:rPr lang="nl-NL" dirty="0" smtClean="0"/>
+              <a:t> controles on </a:t>
+            </a:r>
+            <a:r>
+              <a:rPr lang="nl-NL" dirty="0" err="1" smtClean="0"/>
+              <a:t>static</a:t>
+            </a:r>
+            <a:r>
+              <a:rPr lang="nl-NL" dirty="0" smtClean="0"/>
+              <a:t> </a:t>
+            </a:r>
+            <a:r>
+              <a:rPr lang="nl-NL" dirty="0" err="1" smtClean="0"/>
+              <a:t>typing</a:t>
+            </a:r>
+            <a:endParaRPr lang="nl-NL" dirty="0" smtClean="0"/>
+          </a:p>
+          <a:p>
+            <a:endParaRPr lang="nl-NL" dirty="0" smtClean="0"/>
+          </a:p>
+          <a:p>
+            <a:r>
+              <a:rPr lang="nl-NL" dirty="0" err="1" smtClean="0"/>
+              <a:t>Create</a:t>
+            </a:r>
+            <a:r>
+              <a:rPr lang="nl-NL" dirty="0" smtClean="0"/>
+              <a:t> more </a:t>
+            </a:r>
+            <a:r>
+              <a:rPr lang="nl-NL" dirty="0" err="1" smtClean="0"/>
+              <a:t>documentclassse</a:t>
+            </a:r>
+            <a:r>
+              <a:rPr lang="nl-NL" dirty="0" err="1" smtClean="0"/>
+              <a:t>s</a:t>
+            </a:r>
+            <a:r>
+              <a:rPr lang="nl-NL" dirty="0" smtClean="0"/>
+              <a:t> </a:t>
+            </a:r>
+            <a:r>
+              <a:rPr lang="nl-NL" dirty="0" smtClean="0"/>
+              <a:t>(</a:t>
+            </a:r>
+            <a:r>
+              <a:rPr lang="nl-NL" dirty="0" err="1" smtClean="0"/>
+              <a:t>article</a:t>
+            </a:r>
+            <a:r>
+              <a:rPr lang="nl-NL" dirty="0" smtClean="0"/>
+              <a:t>, letter, </a:t>
+            </a:r>
+            <a:r>
+              <a:rPr lang="nl-NL" dirty="0" err="1" smtClean="0"/>
+              <a:t>book</a:t>
+            </a:r>
+            <a:r>
+              <a:rPr lang="nl-NL" dirty="0" smtClean="0"/>
+              <a:t>,…)</a:t>
+            </a:r>
+            <a:endParaRPr lang="nl-NL" dirty="0" smtClean="0"/>
+          </a:p>
+        </p:txBody>
+      </p:sp>
+      <p:sp>
+        <p:nvSpPr>
+          <p:cNvPr id="4" name="Footer Placeholder 3"/>
+          <p:cNvSpPr>
+            <a:spLocks noGrp="1"/>
+          </p:cNvSpPr>
+          <p:nvPr>
+            <p:ph type="ftr" sz="quarter" idx="11"/>
+          </p:nvPr>
+        </p:nvSpPr>
+        <p:spPr/>
+        <p:txBody>
+          <a:bodyPr/>
+          <a:lstStyle/>
+          <a:p>
+            <a:r>
+              <a:rPr lang="nl-BE" dirty="0" smtClean="0"/>
+              <a:t>Titouan Vervack</a:t>
+            </a:r>
+          </a:p>
+          <a:p>
+            <a:r>
+              <a:rPr lang="nl-BE" dirty="0" smtClean="0"/>
+              <a:t>Promotor: Professor Marko van Dooren</a:t>
+            </a:r>
             <a:endParaRPr lang="nl-BE" dirty="0"/>
           </a:p>
         </p:txBody>
@@ -5222,43 +5950,10 @@
           </a:p>
         </p:txBody>
       </p:sp>
-      <p:sp>
-        <p:nvSpPr>
-          <p:cNvPr id="6" name="Footer Placeholder 5"/>
-          <p:cNvSpPr>
-            <a:spLocks noGrp="1"/>
-          </p:cNvSpPr>
-          <p:nvPr>
-            <p:ph type="ftr" sz="quarter" idx="11"/>
-          </p:nvPr>
-        </p:nvSpPr>
-        <p:spPr/>
-        <p:txBody>
-          <a:bodyPr/>
-          <a:lstStyle/>
-          <a:p>
-            <a:r>
-              <a:rPr lang="nl-BE" dirty="0" smtClean="0"/>
-              <a:t>Titouan Vervack</a:t>
-            </a:r>
-          </a:p>
-          <a:p>
-            <a:r>
-              <a:rPr lang="nl-BE" smtClean="0"/>
-              <a:t>Promotor</a:t>
-            </a:r>
-            <a:r>
-              <a:rPr lang="nl-BE" dirty="0" smtClean="0"/>
-              <a:t>: Professor Marko van Dooren</a:t>
-            </a:r>
-            <a:endParaRPr lang="nl-BE" dirty="0"/>
-          </a:p>
-        </p:txBody>
-      </p:sp>
     </p:spTree>
     <p:extLst>
       <p:ext uri="{BB962C8B-B14F-4D97-AF65-F5344CB8AC3E}">
-        <p14:creationId xmlns:p14="http://schemas.microsoft.com/office/powerpoint/2010/main" val="164774279"/>
+        <p14:creationId xmlns:p14="http://schemas.microsoft.com/office/powerpoint/2010/main" val="1338530883"/>
       </p:ext>
     </p:extLst>
   </p:cSld>
@@ -5310,12 +6005,43 @@
           <a:lstStyle/>
           <a:p>
             <a:r>
-              <a:rPr lang="nl-NL" dirty="0" smtClean="0"/>
-              <a:t>New </a:t>
-            </a:r>
-            <a:r>
-              <a:rPr lang="nl-NL" dirty="0" err="1" smtClean="0"/>
-              <a:t>markup</a:t>
+              <a:rPr lang="nl-NL" dirty="0" err="1" smtClean="0"/>
+              <a:t>What</a:t>
+            </a:r>
+            <a:r>
+              <a:rPr lang="nl-NL" dirty="0" smtClean="0"/>
+              <a:t> is </a:t>
+            </a:r>
+            <a:r>
+              <a:rPr lang="nl-NL" dirty="0" err="1" smtClean="0"/>
+              <a:t>it</a:t>
+            </a:r>
+            <a:r>
+              <a:rPr lang="nl-NL" dirty="0" smtClean="0"/>
+              <a:t>?</a:t>
+            </a:r>
+            <a:endParaRPr lang="nl-BE" dirty="0"/>
+          </a:p>
+        </p:txBody>
+      </p:sp>
+      <p:sp>
+        <p:nvSpPr>
+          <p:cNvPr id="3" name="Content Placeholder 2"/>
+          <p:cNvSpPr>
+            <a:spLocks noGrp="1"/>
+          </p:cNvSpPr>
+          <p:nvPr>
+            <p:ph idx="1"/>
+          </p:nvPr>
+        </p:nvSpPr>
+        <p:spPr/>
+        <p:txBody>
+          <a:bodyPr/>
+          <a:lstStyle/>
+          <a:p>
+            <a:r>
+              <a:rPr lang="nl-NL" dirty="0" err="1" smtClean="0"/>
+              <a:t>Markup</a:t>
             </a:r>
             <a:r>
               <a:rPr lang="nl-NL" dirty="0" smtClean="0"/>
@@ -5327,11 +6053,24 @@
             </a:r>
             <a:r>
               <a:rPr lang="nl-NL" dirty="0" smtClean="0"/>
+              <a:t>	</a:t>
+            </a:r>
+          </a:p>
+          <a:p>
+            <a:endParaRPr lang="nl-NL" dirty="0" smtClean="0"/>
+          </a:p>
+          <a:p>
+            <a:r>
+              <a:rPr lang="nl-NL" dirty="0" err="1" smtClean="0"/>
+              <a:t>Inspired</a:t>
+            </a:r>
+            <a:r>
+              <a:rPr lang="nl-NL" dirty="0" smtClean="0"/>
               <a:t> </a:t>
             </a:r>
             <a:r>
               <a:rPr lang="nl-NL" dirty="0" err="1" smtClean="0"/>
-              <a:t>inspired</a:t>
+              <a:t>by</a:t>
             </a:r>
             <a:r>
               <a:rPr lang="nl-NL" dirty="0" smtClean="0"/>
@@ -5339,52 +6078,43 @@
             </a:r>
             <a:r>
               <a:rPr lang="nl-NL" dirty="0" err="1" smtClean="0"/>
-              <a:t>by</a:t>
-            </a:r>
-            <a:r>
-              <a:rPr lang="nl-NL" dirty="0" smtClean="0"/>
+              <a:t>TeX</a:t>
+            </a:r>
+            <a:r>
+              <a:rPr lang="nl-NL" dirty="0"/>
               <a:t> </a:t>
             </a:r>
             <a:r>
-              <a:rPr lang="nl-NL" smtClean="0"/>
-              <a:t>TeX/</a:t>
+              <a:rPr lang="nl-NL" dirty="0" err="1" smtClean="0"/>
+              <a:t>and</a:t>
+            </a:r>
+            <a:r>
+              <a:rPr lang="nl-NL" dirty="0" smtClean="0"/>
+              <a:t> </a:t>
             </a:r>
             <a:r>
               <a:rPr lang="nl-NL" dirty="0" err="1" smtClean="0"/>
               <a:t>markdown</a:t>
             </a:r>
-            <a:r>
-              <a:rPr lang="nl-NL" dirty="0" smtClean="0"/>
-              <a:t>/</a:t>
-            </a:r>
-            <a:r>
-              <a:rPr lang="nl-NL" dirty="0" err="1" smtClean="0"/>
-              <a:t>textediting</a:t>
-            </a:r>
-            <a:r>
-              <a:rPr lang="nl-NL" dirty="0" smtClean="0"/>
-              <a:t> program e.g. word</a:t>
-            </a:r>
+            <a:endParaRPr lang="nl-NL" dirty="0" smtClean="0"/>
+          </a:p>
+          <a:p>
+            <a:pPr marL="0" indent="0">
+              <a:buNone/>
+            </a:pPr>
+            <a:endParaRPr lang="nl-NL" dirty="0"/>
+          </a:p>
+          <a:p>
+            <a:pPr marL="0" indent="0">
+              <a:buNone/>
+            </a:pPr>
+            <a:endParaRPr lang="nl-NL" dirty="0" smtClean="0"/>
+          </a:p>
+          <a:p>
+            <a:pPr marL="0" indent="0">
+              <a:buNone/>
+            </a:pPr>
             <a:endParaRPr lang="nl-BE" dirty="0"/>
-          </a:p>
-        </p:txBody>
-      </p:sp>
-      <p:sp>
-        <p:nvSpPr>
-          <p:cNvPr id="3" name="Content Placeholder 2"/>
-          <p:cNvSpPr>
-            <a:spLocks noGrp="1"/>
-          </p:cNvSpPr>
-          <p:nvPr>
-            <p:ph idx="1"/>
-          </p:nvPr>
-        </p:nvSpPr>
-        <p:spPr/>
-        <p:txBody>
-          <a:bodyPr/>
-          <a:lstStyle/>
-          <a:p>
-            <a:endParaRPr lang="nl-BE"/>
           </a:p>
         </p:txBody>
       </p:sp>
@@ -5444,6 +6174,272 @@
     <p:extLst>
       <p:ext uri="{BB962C8B-B14F-4D97-AF65-F5344CB8AC3E}">
         <p14:creationId xmlns:p14="http://schemas.microsoft.com/office/powerpoint/2010/main" val="1644689065"/>
+      </p:ext>
+    </p:extLst>
+  </p:cSld>
+  <p:clrMapOvr>
+    <a:masterClrMapping/>
+  </p:clrMapOvr>
+  <p:timing>
+    <p:tnLst>
+      <p:par>
+        <p:cTn id="1" dur="indefinite" restart="never" nodeType="tmRoot"/>
+      </p:par>
+    </p:tnLst>
+  </p:timing>
+</p:sld>
+</file>
+
+<file path=ppt/slides/slide20.xml><?xml version="1.0" encoding="utf-8"?>
+<p:sld xmlns:a="http://schemas.openxmlformats.org/drawingml/2006/main" xmlns:r="http://schemas.openxmlformats.org/officeDocument/2006/relationships" xmlns:p="http://schemas.openxmlformats.org/presentationml/2006/main">
+  <p:cSld>
+    <p:spTree>
+      <p:nvGrpSpPr>
+        <p:cNvPr id="1" name=""/>
+        <p:cNvGrpSpPr/>
+        <p:nvPr/>
+      </p:nvGrpSpPr>
+      <p:grpSpPr>
+        <a:xfrm>
+          <a:off x="0" y="0"/>
+          <a:ext cx="0" cy="0"/>
+          <a:chOff x="0" y="0"/>
+          <a:chExt cx="0" cy="0"/>
+        </a:xfrm>
+      </p:grpSpPr>
+      <p:sp>
+        <p:nvSpPr>
+          <p:cNvPr id="2" name="Title 1"/>
+          <p:cNvSpPr>
+            <a:spLocks noGrp="1"/>
+          </p:cNvSpPr>
+          <p:nvPr>
+            <p:ph type="title"/>
+          </p:nvPr>
+        </p:nvSpPr>
+        <p:spPr/>
+        <p:txBody>
+          <a:bodyPr/>
+          <a:lstStyle/>
+          <a:p>
+            <a:r>
+              <a:rPr lang="nl-NL" dirty="0" err="1" smtClean="0"/>
+              <a:t>Future</a:t>
+            </a:r>
+            <a:r>
+              <a:rPr lang="nl-NL" dirty="0" smtClean="0"/>
+              <a:t> </a:t>
+            </a:r>
+            <a:r>
+              <a:rPr lang="nl-NL" dirty="0" err="1" smtClean="0"/>
+              <a:t>work</a:t>
+            </a:r>
+            <a:r>
+              <a:rPr lang="nl-NL" dirty="0" smtClean="0"/>
+              <a:t>	</a:t>
+            </a:r>
+            <a:endParaRPr lang="nl-BE" dirty="0"/>
+          </a:p>
+        </p:txBody>
+      </p:sp>
+      <p:sp>
+        <p:nvSpPr>
+          <p:cNvPr id="3" name="Content Placeholder 2"/>
+          <p:cNvSpPr>
+            <a:spLocks noGrp="1"/>
+          </p:cNvSpPr>
+          <p:nvPr>
+            <p:ph idx="1"/>
+          </p:nvPr>
+        </p:nvSpPr>
+        <p:spPr/>
+        <p:txBody>
+          <a:bodyPr/>
+          <a:lstStyle/>
+          <a:p>
+            <a:r>
+              <a:rPr lang="nl-NL" dirty="0" smtClean="0"/>
+              <a:t>Native output </a:t>
+            </a:r>
+            <a:r>
+              <a:rPr lang="nl-NL" dirty="0" err="1" smtClean="0"/>
+              <a:t>to</a:t>
+            </a:r>
+            <a:r>
+              <a:rPr lang="nl-NL" dirty="0" smtClean="0"/>
+              <a:t> </a:t>
+            </a:r>
+            <a:r>
+              <a:rPr lang="nl-NL" dirty="0" err="1" smtClean="0"/>
+              <a:t>languages</a:t>
+            </a:r>
+            <a:r>
+              <a:rPr lang="nl-NL" dirty="0" smtClean="0"/>
+              <a:t> </a:t>
+            </a:r>
+            <a:r>
+              <a:rPr lang="nl-NL" dirty="0" err="1" smtClean="0"/>
+              <a:t>other</a:t>
+            </a:r>
+            <a:r>
+              <a:rPr lang="nl-NL" dirty="0" smtClean="0"/>
+              <a:t> </a:t>
+            </a:r>
+            <a:r>
+              <a:rPr lang="nl-NL" dirty="0" err="1" smtClean="0"/>
+              <a:t>than</a:t>
+            </a:r>
+            <a:r>
+              <a:rPr lang="nl-NL" dirty="0" smtClean="0"/>
+              <a:t> latex</a:t>
+            </a:r>
+          </a:p>
+          <a:p>
+            <a:endParaRPr lang="nl-NL" dirty="0" smtClean="0"/>
+          </a:p>
+          <a:p>
+            <a:r>
+              <a:rPr lang="nl-NL" dirty="0" err="1" smtClean="0"/>
+              <a:t>Further</a:t>
+            </a:r>
+            <a:r>
+              <a:rPr lang="nl-NL" dirty="0" smtClean="0"/>
+              <a:t> </a:t>
+            </a:r>
+            <a:r>
+              <a:rPr lang="nl-NL" dirty="0" err="1" smtClean="0"/>
+              <a:t>implementation</a:t>
+            </a:r>
+            <a:r>
+              <a:rPr lang="nl-NL" dirty="0" smtClean="0"/>
+              <a:t> </a:t>
+            </a:r>
+            <a:r>
+              <a:rPr lang="nl-NL" dirty="0" smtClean="0"/>
+              <a:t>of </a:t>
+            </a:r>
+            <a:r>
+              <a:rPr lang="nl-NL" dirty="0" err="1" smtClean="0"/>
+              <a:t>commonly</a:t>
+            </a:r>
+            <a:r>
+              <a:rPr lang="nl-NL" dirty="0" smtClean="0"/>
+              <a:t> </a:t>
+            </a:r>
+            <a:r>
+              <a:rPr lang="nl-NL" dirty="0" err="1" smtClean="0"/>
+              <a:t>used</a:t>
+            </a:r>
+            <a:r>
+              <a:rPr lang="nl-NL" dirty="0" smtClean="0"/>
+              <a:t> latex </a:t>
+            </a:r>
+            <a:r>
+              <a:rPr lang="nl-NL" dirty="0" smtClean="0"/>
+              <a:t>packages</a:t>
+            </a:r>
+          </a:p>
+          <a:p>
+            <a:endParaRPr lang="nl-NL" dirty="0"/>
+          </a:p>
+          <a:p>
+            <a:r>
+              <a:rPr lang="nl-NL" dirty="0" smtClean="0"/>
+              <a:t>Compiler </a:t>
+            </a:r>
+            <a:r>
+              <a:rPr lang="nl-NL" dirty="0" err="1" smtClean="0"/>
+              <a:t>optimizations</a:t>
+            </a:r>
+            <a:endParaRPr lang="nl-NL" dirty="0" smtClean="0"/>
+          </a:p>
+          <a:p>
+            <a:endParaRPr lang="nl-NL" dirty="0"/>
+          </a:p>
+          <a:p>
+            <a:r>
+              <a:rPr lang="nl-NL" dirty="0" smtClean="0"/>
+              <a:t>Automatic double latex </a:t>
+            </a:r>
+            <a:r>
+              <a:rPr lang="nl-NL" dirty="0" err="1" smtClean="0"/>
+              <a:t>compile</a:t>
+            </a:r>
+            <a:r>
+              <a:rPr lang="nl-NL" dirty="0" smtClean="0"/>
+              <a:t> </a:t>
+            </a:r>
+            <a:r>
+              <a:rPr lang="nl-NL" dirty="0" err="1" smtClean="0"/>
+              <a:t>detection</a:t>
+            </a:r>
+            <a:endParaRPr lang="nl-NL" dirty="0" smtClean="0"/>
+          </a:p>
+          <a:p>
+            <a:endParaRPr lang="nl-BE" dirty="0"/>
+          </a:p>
+        </p:txBody>
+      </p:sp>
+      <p:sp>
+        <p:nvSpPr>
+          <p:cNvPr id="5" name="Slide Number Placeholder 4"/>
+          <p:cNvSpPr>
+            <a:spLocks noGrp="1"/>
+          </p:cNvSpPr>
+          <p:nvPr>
+            <p:ph type="sldNum" sz="quarter" idx="12"/>
+          </p:nvPr>
+        </p:nvSpPr>
+        <p:spPr/>
+        <p:txBody>
+          <a:bodyPr/>
+          <a:lstStyle/>
+          <a:p>
+            <a:fld id="{EC62D88F-3C07-4650-841D-B7EE54B2B1B9}" type="slidenum">
+              <a:rPr lang="nl-BE" smtClean="0"/>
+              <a:t>20</a:t>
+            </a:fld>
+            <a:endParaRPr lang="nl-BE"/>
+          </a:p>
+        </p:txBody>
+      </p:sp>
+      <p:sp>
+        <p:nvSpPr>
+          <p:cNvPr id="6" name="Footer Placeholder 5"/>
+          <p:cNvSpPr>
+            <a:spLocks noGrp="1"/>
+          </p:cNvSpPr>
+          <p:nvPr>
+            <p:ph type="ftr" sz="quarter" idx="11"/>
+          </p:nvPr>
+        </p:nvSpPr>
+        <p:spPr/>
+        <p:txBody>
+          <a:bodyPr/>
+          <a:lstStyle/>
+          <a:p>
+            <a:r>
+              <a:rPr lang="nl-BE" dirty="0" smtClean="0"/>
+              <a:t>Titouan Vervack</a:t>
+            </a:r>
+          </a:p>
+          <a:p>
+            <a:r>
+              <a:rPr lang="nl-BE" smtClean="0"/>
+              <a:t>Promotor</a:t>
+            </a:r>
+            <a:r>
+              <a:rPr lang="nl-BE" dirty="0" smtClean="0"/>
+              <a:t>: Professor Marko van Dooren</a:t>
+            </a:r>
+            <a:endParaRPr lang="nl-BE" dirty="0"/>
+          </a:p>
+        </p:txBody>
+      </p:sp>
+    </p:spTree>
+    <p:extLst>
+      <p:ext uri="{BB962C8B-B14F-4D97-AF65-F5344CB8AC3E}">
+        <p14:creationId xmlns:p14="http://schemas.microsoft.com/office/powerpoint/2010/main" val="164774279"/>
       </p:ext>
     </p:extLst>
   </p:cSld>
@@ -5502,7 +6498,15 @@
             </a:r>
             <a:r>
               <a:rPr lang="nl-NL" dirty="0" err="1" smtClean="0"/>
-              <a:t>withMarkdown</a:t>
+              <a:t>with</a:t>
+            </a:r>
+            <a:r>
+              <a:rPr lang="nl-NL" dirty="0" smtClean="0"/>
+              <a:t> </a:t>
+            </a:r>
+            <a:r>
+              <a:rPr lang="nl-NL" dirty="0" err="1" smtClean="0"/>
+              <a:t>Markdown</a:t>
             </a:r>
             <a:endParaRPr lang="nl-BE" dirty="0"/>
           </a:p>
@@ -5522,6 +6526,49 @@
         <p:txBody>
           <a:bodyPr/>
           <a:lstStyle/>
+          <a:p>
+            <a:r>
+              <a:rPr lang="nl-NL" dirty="0" err="1" smtClean="0"/>
+              <a:t>Not</a:t>
+            </a:r>
+            <a:r>
+              <a:rPr lang="nl-NL" dirty="0" smtClean="0"/>
+              <a:t> </a:t>
+            </a:r>
+            <a:r>
+              <a:rPr lang="nl-NL" dirty="0" err="1" smtClean="0"/>
+              <a:t>extensible</a:t>
+            </a:r>
+            <a:endParaRPr lang="nl-NL" dirty="0"/>
+          </a:p>
+          <a:p>
+            <a:endParaRPr lang="nl-NL" dirty="0" smtClean="0"/>
+          </a:p>
+          <a:p>
+            <a:r>
+              <a:rPr lang="nl-NL" dirty="0" smtClean="0"/>
+              <a:t>Too </a:t>
+            </a:r>
+            <a:r>
+              <a:rPr lang="nl-NL" dirty="0" err="1" smtClean="0"/>
+              <a:t>simple</a:t>
+            </a:r>
+            <a:r>
+              <a:rPr lang="nl-NL" dirty="0" smtClean="0"/>
+              <a:t> (no </a:t>
+            </a:r>
+            <a:r>
+              <a:rPr lang="nl-NL" dirty="0" err="1" smtClean="0"/>
+              <a:t>customisation</a:t>
+            </a:r>
+            <a:r>
+              <a:rPr lang="nl-NL" dirty="0" smtClean="0"/>
+              <a:t>) </a:t>
+            </a:r>
+          </a:p>
+          <a:p>
+            <a:endParaRPr lang="nl-NL" dirty="0"/>
+          </a:p>
           <a:p>
             <a:endParaRPr lang="nl-BE" dirty="0"/>
           </a:p>
@@ -5670,7 +6717,87 @@
           <a:bodyPr/>
           <a:lstStyle/>
           <a:p>
-            <a:endParaRPr lang="nl-BE"/>
+            <a:r>
+              <a:rPr lang="nl-NL" dirty="0" err="1" smtClean="0"/>
+              <a:t>Steep</a:t>
+            </a:r>
+            <a:r>
+              <a:rPr lang="nl-NL" dirty="0" smtClean="0"/>
+              <a:t> </a:t>
+            </a:r>
+            <a:r>
+              <a:rPr lang="nl-NL" dirty="0" err="1" smtClean="0"/>
+              <a:t>initial</a:t>
+            </a:r>
+            <a:r>
+              <a:rPr lang="nl-NL" dirty="0" smtClean="0"/>
+              <a:t> </a:t>
+            </a:r>
+            <a:r>
+              <a:rPr lang="nl-NL" dirty="0" err="1" smtClean="0"/>
+              <a:t>learning</a:t>
+            </a:r>
+            <a:r>
+              <a:rPr lang="nl-NL" dirty="0" smtClean="0"/>
+              <a:t> curve</a:t>
+            </a:r>
+          </a:p>
+          <a:p>
+            <a:endParaRPr lang="nl-NL" dirty="0"/>
+          </a:p>
+          <a:p>
+            <a:r>
+              <a:rPr lang="nl-NL" dirty="0" err="1" smtClean="0"/>
+              <a:t>Allows</a:t>
+            </a:r>
+            <a:r>
+              <a:rPr lang="nl-NL" dirty="0" smtClean="0"/>
+              <a:t> </a:t>
+            </a:r>
+            <a:r>
+              <a:rPr lang="nl-NL" dirty="0" err="1" smtClean="0"/>
+              <a:t>redefenition</a:t>
+            </a:r>
+            <a:r>
+              <a:rPr lang="nl-NL" dirty="0" smtClean="0"/>
+              <a:t> of </a:t>
+            </a:r>
+            <a:r>
+              <a:rPr lang="nl-NL" dirty="0" err="1" smtClean="0"/>
+              <a:t>commands</a:t>
+            </a:r>
+            <a:endParaRPr lang="nl-NL" dirty="0"/>
+          </a:p>
+          <a:p>
+            <a:endParaRPr lang="nl-NL" dirty="0" smtClean="0"/>
+          </a:p>
+          <a:p>
+            <a:r>
+              <a:rPr lang="nl-NL" dirty="0" err="1" smtClean="0"/>
+              <a:t>Overly</a:t>
+            </a:r>
+            <a:r>
+              <a:rPr lang="nl-NL" dirty="0" smtClean="0"/>
+              <a:t> complex</a:t>
+            </a:r>
+          </a:p>
+          <a:p>
+            <a:endParaRPr lang="nl-NL" dirty="0"/>
+          </a:p>
+          <a:p>
+            <a:r>
+              <a:rPr lang="nl-NL" dirty="0" err="1" smtClean="0"/>
+              <a:t>Not</a:t>
+            </a:r>
+            <a:r>
+              <a:rPr lang="nl-NL" dirty="0" smtClean="0"/>
+              <a:t> </a:t>
+            </a:r>
+            <a:r>
+              <a:rPr lang="nl-NL" dirty="0" err="1" smtClean="0"/>
+              <a:t>static</a:t>
+            </a:r>
+            <a:endParaRPr lang="nl-BE" dirty="0"/>
           </a:p>
         </p:txBody>
       </p:sp>
@@ -5813,7 +6940,107 @@
           <a:bodyPr/>
           <a:lstStyle/>
           <a:p>
-            <a:endParaRPr lang="nl-BE"/>
+            <a:r>
+              <a:rPr lang="nl-NL" dirty="0" err="1" smtClean="0"/>
+              <a:t>Corruptable</a:t>
+            </a:r>
+            <a:r>
+              <a:rPr lang="nl-NL" dirty="0" smtClean="0"/>
+              <a:t> fileformat</a:t>
+            </a:r>
+          </a:p>
+          <a:p>
+            <a:endParaRPr lang="nl-NL" dirty="0"/>
+          </a:p>
+          <a:p>
+            <a:r>
+              <a:rPr lang="nl-NL" dirty="0" err="1" smtClean="0"/>
+              <a:t>Not</a:t>
+            </a:r>
+            <a:r>
+              <a:rPr lang="nl-NL" dirty="0" smtClean="0"/>
+              <a:t> platform independent</a:t>
+            </a:r>
+          </a:p>
+          <a:p>
+            <a:endParaRPr lang="nl-NL" dirty="0"/>
+          </a:p>
+          <a:p>
+            <a:r>
+              <a:rPr lang="nl-NL" dirty="0" smtClean="0"/>
+              <a:t>Overkill </a:t>
+            </a:r>
+            <a:r>
+              <a:rPr lang="nl-NL" dirty="0" err="1" smtClean="0"/>
+              <a:t>for</a:t>
+            </a:r>
+            <a:r>
+              <a:rPr lang="nl-NL" dirty="0" smtClean="0"/>
+              <a:t> </a:t>
+            </a:r>
+            <a:r>
+              <a:rPr lang="nl-NL" dirty="0" err="1" smtClean="0"/>
+              <a:t>very</a:t>
+            </a:r>
+            <a:r>
+              <a:rPr lang="nl-NL" dirty="0" smtClean="0"/>
+              <a:t> </a:t>
+            </a:r>
+            <a:r>
+              <a:rPr lang="nl-NL" dirty="0" err="1" smtClean="0"/>
+              <a:t>simple</a:t>
+            </a:r>
+            <a:r>
+              <a:rPr lang="nl-NL" dirty="0" smtClean="0"/>
+              <a:t> </a:t>
+            </a:r>
+            <a:r>
+              <a:rPr lang="nl-NL" dirty="0" err="1" smtClean="0"/>
+              <a:t>documents</a:t>
+            </a:r>
+            <a:endParaRPr lang="nl-NL" dirty="0" smtClean="0"/>
+          </a:p>
+          <a:p>
+            <a:endParaRPr lang="nl-NL" dirty="0"/>
+          </a:p>
+          <a:p>
+            <a:r>
+              <a:rPr lang="nl-NL" dirty="0" err="1" smtClean="0"/>
+              <a:t>Not</a:t>
+            </a:r>
+            <a:r>
+              <a:rPr lang="nl-NL" dirty="0" smtClean="0"/>
+              <a:t> best </a:t>
+            </a:r>
+            <a:r>
+              <a:rPr lang="nl-NL" dirty="0" err="1" smtClean="0"/>
+              <a:t>suited</a:t>
+            </a:r>
+            <a:r>
+              <a:rPr lang="nl-NL" dirty="0" smtClean="0"/>
+              <a:t> </a:t>
+            </a:r>
+            <a:r>
+              <a:rPr lang="nl-NL" dirty="0" err="1" smtClean="0"/>
+              <a:t>for</a:t>
+            </a:r>
+            <a:r>
+              <a:rPr lang="nl-NL" dirty="0" smtClean="0"/>
+              <a:t> </a:t>
+            </a:r>
+            <a:r>
+              <a:rPr lang="nl-NL" dirty="0" err="1" smtClean="0"/>
+              <a:t>very</a:t>
+            </a:r>
+            <a:r>
+              <a:rPr lang="nl-NL" dirty="0" smtClean="0"/>
+              <a:t> complex </a:t>
+            </a:r>
+            <a:r>
+              <a:rPr lang="nl-NL" dirty="0" err="1" smtClean="0"/>
+              <a:t>documents</a:t>
+            </a:r>
+            <a:endParaRPr lang="nl-BE" dirty="0"/>
           </a:p>
         </p:txBody>
       </p:sp>
@@ -5944,7 +7171,94 @@
           <a:bodyPr/>
           <a:lstStyle/>
           <a:p>
-            <a:endParaRPr lang="nl-BE"/>
+            <a:r>
+              <a:rPr lang="nl-NL" dirty="0" smtClean="0"/>
+              <a:t>Easy </a:t>
+            </a:r>
+            <a:r>
+              <a:rPr lang="nl-NL" dirty="0" err="1" smtClean="0"/>
+              <a:t>to</a:t>
+            </a:r>
+            <a:r>
+              <a:rPr lang="nl-NL" dirty="0" smtClean="0"/>
+              <a:t> get </a:t>
+            </a:r>
+            <a:r>
+              <a:rPr lang="nl-NL" dirty="0" err="1" smtClean="0"/>
+              <a:t>started</a:t>
+            </a:r>
+            <a:r>
+              <a:rPr lang="nl-NL" dirty="0" smtClean="0"/>
+              <a:t> </a:t>
+            </a:r>
+            <a:r>
+              <a:rPr lang="nl-NL" dirty="0" err="1" smtClean="0"/>
+              <a:t>with</a:t>
+            </a:r>
+            <a:endParaRPr lang="nl-NL" dirty="0" smtClean="0"/>
+          </a:p>
+          <a:p>
+            <a:endParaRPr lang="nl-NL" dirty="0"/>
+          </a:p>
+          <a:p>
+            <a:r>
+              <a:rPr lang="nl-NL" dirty="0" smtClean="0"/>
+              <a:t>As </a:t>
+            </a:r>
+            <a:r>
+              <a:rPr lang="nl-NL" dirty="0" err="1" smtClean="0"/>
+              <a:t>powerful</a:t>
+            </a:r>
+            <a:r>
+              <a:rPr lang="nl-NL" dirty="0" smtClean="0"/>
+              <a:t> as </a:t>
+            </a:r>
+            <a:r>
+              <a:rPr lang="nl-NL" dirty="0" err="1" smtClean="0"/>
+              <a:t>TeX</a:t>
+            </a:r>
+            <a:endParaRPr lang="nl-NL" dirty="0" smtClean="0"/>
+          </a:p>
+          <a:p>
+            <a:endParaRPr lang="nl-NL" dirty="0"/>
+          </a:p>
+          <a:p>
+            <a:r>
+              <a:rPr lang="nl-NL" dirty="0" smtClean="0"/>
+              <a:t>As </a:t>
+            </a:r>
+            <a:r>
+              <a:rPr lang="nl-NL" dirty="0" err="1" smtClean="0"/>
+              <a:t>simple</a:t>
+            </a:r>
+            <a:r>
+              <a:rPr lang="nl-NL" dirty="0" smtClean="0"/>
+              <a:t> as </a:t>
+            </a:r>
+            <a:r>
+              <a:rPr lang="nl-NL" dirty="0" err="1" smtClean="0"/>
+              <a:t>markdown</a:t>
+            </a:r>
+            <a:endParaRPr lang="nl-NL" dirty="0" smtClean="0"/>
+          </a:p>
+          <a:p>
+            <a:endParaRPr lang="nl-NL" dirty="0"/>
+          </a:p>
+          <a:p>
+            <a:r>
+              <a:rPr lang="nl-NL" dirty="0" err="1" smtClean="0"/>
+              <a:t>Static</a:t>
+            </a:r>
+            <a:r>
+              <a:rPr lang="nl-NL" dirty="0" smtClean="0"/>
+              <a:t> typesystem</a:t>
+            </a:r>
+          </a:p>
+          <a:p>
+            <a:endParaRPr lang="nl-NL" dirty="0"/>
+          </a:p>
+          <a:p>
+            <a:endParaRPr lang="nl-BE" dirty="0"/>
           </a:p>
         </p:txBody>
       </p:sp>
@@ -6053,12 +7367,12 @@
           <a:lstStyle/>
           <a:p>
             <a:r>
-              <a:rPr lang="nl-NL" dirty="0" smtClean="0"/>
-              <a:t>High level </a:t>
-            </a:r>
-            <a:r>
-              <a:rPr lang="nl-NL" dirty="0" err="1" smtClean="0"/>
-              <a:t>architecture</a:t>
+              <a:rPr lang="nl-NL" dirty="0" err="1" smtClean="0"/>
+              <a:t>Compile</a:t>
+            </a:r>
+            <a:r>
+              <a:rPr lang="nl-NL" dirty="0" smtClean="0"/>
+              <a:t> flow</a:t>
             </a:r>
             <a:endParaRPr lang="nl-BE" dirty="0"/>
           </a:p>
@@ -6188,6 +7502,36 @@
           </a:p>
         </p:txBody>
       </p:sp>
+      <p:pic>
+        <p:nvPicPr>
+          <p:cNvPr id="6" name="Picture 5"/>
+          <p:cNvPicPr>
+            <a:picLocks noChangeAspect="1"/>
+          </p:cNvPicPr>
+          <p:nvPr/>
+        </p:nvPicPr>
+        <p:blipFill>
+          <a:blip r:embed="rId2">
+            <a:extLst>
+              <a:ext uri="{28A0092B-C50C-407E-A947-70E740481C1C}">
+                <a14:useLocalDpi xmlns:a14="http://schemas.microsoft.com/office/drawing/2010/main" val="0"/>
+              </a:ext>
+            </a:extLst>
+          </a:blip>
+          <a:stretch>
+            <a:fillRect/>
+          </a:stretch>
+        </p:blipFill>
+        <p:spPr>
+          <a:xfrm>
+            <a:off x="216567" y="1750210"/>
+            <a:ext cx="11702717" cy="4208322"/>
+          </a:xfrm>
+          <a:prstGeom prst="rect">
+            <a:avLst/>
+          </a:prstGeom>
+        </p:spPr>
+      </p:pic>
     </p:spTree>
     <p:extLst>
       <p:ext uri="{BB962C8B-B14F-4D97-AF65-F5344CB8AC3E}">
@@ -6273,23 +7617,33 @@
             </a:r>
             <a:r>
               <a:rPr lang="nl-NL" dirty="0" smtClean="0"/>
-              <a:t> syntax: </a:t>
-            </a:r>
-            <a:r>
-              <a:rPr lang="nl-NL" dirty="0" err="1" smtClean="0"/>
-              <a:t>adoptability</a:t>
-            </a:r>
-            <a:r>
-              <a:rPr lang="nl-NL" dirty="0" smtClean="0"/>
-              <a:t> en makkelijke omzetten van class files naar echte </a:t>
-            </a:r>
-            <a:r>
-              <a:rPr lang="nl-NL" dirty="0" err="1" smtClean="0"/>
-              <a:t>java</a:t>
-            </a:r>
-            <a:r>
-              <a:rPr lang="nl-NL" dirty="0" smtClean="0"/>
-              <a:t> door ~semantiek</a:t>
+              <a:t> </a:t>
+            </a:r>
+            <a:r>
+              <a:rPr lang="nl-NL" dirty="0" smtClean="0"/>
+              <a:t>syntax</a:t>
+            </a:r>
+          </a:p>
+          <a:p>
+            <a:pPr lvl="1"/>
+            <a:r>
+              <a:rPr lang="nl-NL" dirty="0" err="1" smtClean="0"/>
+              <a:t>Adoptability</a:t>
+            </a:r>
+            <a:r>
+              <a:rPr lang="nl-NL" dirty="0" smtClean="0"/>
+              <a:t> </a:t>
+            </a:r>
+          </a:p>
+          <a:p>
+            <a:pPr lvl="1"/>
+            <a:r>
+              <a:rPr lang="nl-NL" dirty="0" smtClean="0"/>
+              <a:t>Easy </a:t>
+            </a:r>
+            <a:r>
+              <a:rPr lang="nl-NL" dirty="0" err="1" smtClean="0"/>
+              <a:t>translation</a:t>
             </a:r>
             <a:endParaRPr lang="nl-BE" dirty="0"/>
           </a:p>
@@ -6347,6 +7701,36 @@
           </a:p>
         </p:txBody>
       </p:sp>
+      <p:pic>
+        <p:nvPicPr>
+          <p:cNvPr id="7" name="Picture 6"/>
+          <p:cNvPicPr>
+            <a:picLocks noChangeAspect="1"/>
+          </p:cNvPicPr>
+          <p:nvPr/>
+        </p:nvPicPr>
+        <p:blipFill>
+          <a:blip r:embed="rId2">
+            <a:extLst>
+              <a:ext uri="{28A0092B-C50C-407E-A947-70E740481C1C}">
+                <a14:useLocalDpi xmlns:a14="http://schemas.microsoft.com/office/drawing/2010/main" val="0"/>
+              </a:ext>
+            </a:extLst>
+          </a:blip>
+          <a:stretch>
+            <a:fillRect/>
+          </a:stretch>
+        </p:blipFill>
+        <p:spPr>
+          <a:xfrm>
+            <a:off x="5011831" y="176463"/>
+            <a:ext cx="4066750" cy="6039853"/>
+          </a:xfrm>
+          <a:prstGeom prst="rect">
+            <a:avLst/>
+          </a:prstGeom>
+        </p:spPr>
+      </p:pic>
     </p:spTree>
     <p:extLst>
       <p:ext uri="{BB962C8B-B14F-4D97-AF65-F5344CB8AC3E}">
@@ -6428,19 +7812,30 @@
           <a:p>
             <a:r>
               <a:rPr lang="nl-NL" dirty="0" err="1" smtClean="0"/>
-              <a:t>Markdown</a:t>
-            </a:r>
-            <a:r>
-              <a:rPr lang="nl-NL" dirty="0" smtClean="0"/>
-              <a:t> like syntax, </a:t>
-            </a:r>
-            <a:r>
-              <a:rPr lang="nl-NL" dirty="0" err="1" smtClean="0"/>
-              <a:t>adoptability</a:t>
-            </a:r>
-            <a:r>
-              <a:rPr lang="nl-NL" dirty="0" smtClean="0"/>
-              <a:t>, easy </a:t>
+              <a:t>Markdownlike</a:t>
+            </a:r>
+            <a:r>
+              <a:rPr lang="nl-NL" dirty="0" smtClean="0"/>
+              <a:t> syntax</a:t>
+            </a:r>
+          </a:p>
+          <a:p>
+            <a:pPr lvl="1"/>
+            <a:r>
+              <a:rPr lang="nl-NL" dirty="0" err="1" smtClean="0"/>
+              <a:t>Adoptability</a:t>
+            </a:r>
+            <a:endParaRPr lang="nl-NL" dirty="0" smtClean="0"/>
+          </a:p>
+          <a:p>
+            <a:pPr lvl="1"/>
+            <a:r>
+              <a:rPr lang="nl-NL" dirty="0"/>
+              <a:t>E</a:t>
+            </a:r>
+            <a:r>
+              <a:rPr lang="nl-NL" dirty="0" smtClean="0"/>
+              <a:t>asy </a:t>
             </a:r>
             <a:r>
               <a:rPr lang="nl-NL" dirty="0" err="1" smtClean="0"/>
@@ -6456,23 +7851,19 @@
             </a:r>
             <a:r>
               <a:rPr lang="nl-NL" dirty="0" smtClean="0"/>
-              <a:t> as </a:t>
-            </a:r>
-            <a:r>
-              <a:rPr lang="nl-NL" dirty="0" err="1" smtClean="0"/>
-              <a:t>plain</a:t>
-            </a:r>
-            <a:r>
-              <a:rPr lang="nl-NL" dirty="0" smtClean="0"/>
-              <a:t> </a:t>
-            </a:r>
-            <a:r>
-              <a:rPr lang="nl-NL" dirty="0" err="1" smtClean="0"/>
-              <a:t>text</a:t>
-            </a:r>
-            <a:r>
-              <a:rPr lang="nl-NL" dirty="0" smtClean="0"/>
-              <a:t>, non </a:t>
+              <a:t>/</a:t>
+            </a:r>
+            <a:r>
+              <a:rPr lang="nl-NL" dirty="0" err="1" smtClean="0"/>
+              <a:t>write</a:t>
+            </a:r>
+            <a:endParaRPr lang="nl-NL" dirty="0" smtClean="0"/>
+          </a:p>
+          <a:p>
+            <a:pPr lvl="1"/>
+            <a:r>
+              <a:rPr lang="nl-NL" dirty="0" smtClean="0"/>
+              <a:t>Non-</a:t>
             </a:r>
             <a:r>
               <a:rPr lang="nl-NL" dirty="0" err="1" smtClean="0"/>
@@ -6534,6 +7925,36 @@
           </a:p>
         </p:txBody>
       </p:sp>
+      <p:pic>
+        <p:nvPicPr>
+          <p:cNvPr id="6" name="Picture 5"/>
+          <p:cNvPicPr>
+            <a:picLocks noChangeAspect="1"/>
+          </p:cNvPicPr>
+          <p:nvPr/>
+        </p:nvPicPr>
+        <p:blipFill>
+          <a:blip r:embed="rId2">
+            <a:extLst>
+              <a:ext uri="{28A0092B-C50C-407E-A947-70E740481C1C}">
+                <a14:useLocalDpi xmlns:a14="http://schemas.microsoft.com/office/drawing/2010/main" val="0"/>
+              </a:ext>
+            </a:extLst>
+          </a:blip>
+          <a:stretch>
+            <a:fillRect/>
+          </a:stretch>
+        </p:blipFill>
+        <p:spPr>
+          <a:xfrm>
+            <a:off x="5201528" y="1339851"/>
+            <a:ext cx="5382376" cy="2381582"/>
+          </a:xfrm>
+          <a:prstGeom prst="rect">
+            <a:avLst/>
+          </a:prstGeom>
+        </p:spPr>
+      </p:pic>
     </p:spTree>
     <p:extLst>
       <p:ext uri="{BB962C8B-B14F-4D97-AF65-F5344CB8AC3E}">

</xml_diff>